<commit_message>
Nova ordem de slides.
</commit_message>
<xml_diff>
--- a/docs/Prometheus.pptx
+++ b/docs/Prometheus.pptx
@@ -15,20 +15,20 @@
     <p:sldId id="337" r:id="rId6"/>
     <p:sldId id="313" r:id="rId7"/>
     <p:sldId id="318" r:id="rId8"/>
-    <p:sldId id="324" r:id="rId9"/>
-    <p:sldId id="323" r:id="rId10"/>
-    <p:sldId id="322" r:id="rId11"/>
-    <p:sldId id="321" r:id="rId12"/>
-    <p:sldId id="320" r:id="rId13"/>
-    <p:sldId id="329" r:id="rId14"/>
-    <p:sldId id="330" r:id="rId15"/>
-    <p:sldId id="327" r:id="rId16"/>
-    <p:sldId id="325" r:id="rId17"/>
-    <p:sldId id="326" r:id="rId18"/>
-    <p:sldId id="328" r:id="rId19"/>
-    <p:sldId id="332" r:id="rId20"/>
-    <p:sldId id="333" r:id="rId21"/>
-    <p:sldId id="334" r:id="rId22"/>
+    <p:sldId id="329" r:id="rId9"/>
+    <p:sldId id="330" r:id="rId10"/>
+    <p:sldId id="327" r:id="rId11"/>
+    <p:sldId id="325" r:id="rId12"/>
+    <p:sldId id="326" r:id="rId13"/>
+    <p:sldId id="324" r:id="rId14"/>
+    <p:sldId id="328" r:id="rId15"/>
+    <p:sldId id="323" r:id="rId16"/>
+    <p:sldId id="322" r:id="rId17"/>
+    <p:sldId id="332" r:id="rId18"/>
+    <p:sldId id="333" r:id="rId19"/>
+    <p:sldId id="321" r:id="rId20"/>
+    <p:sldId id="334" r:id="rId21"/>
+    <p:sldId id="320" r:id="rId22"/>
     <p:sldId id="331" r:id="rId23"/>
     <p:sldId id="335" r:id="rId24"/>
     <p:sldId id="340" r:id="rId25"/>
@@ -876,7 +876,7 @@
     </p:spTree>
     <p:extLst>
       <p:ext uri="{BB962C8B-B14F-4D97-AF65-F5344CB8AC3E}">
-        <p14:creationId xmlns:p14="http://schemas.microsoft.com/office/powerpoint/2010/main" val="3072025035"/>
+        <p14:creationId xmlns:p14="http://schemas.microsoft.com/office/powerpoint/2010/main" val="2163143122"/>
       </p:ext>
     </p:extLst>
   </p:cSld>
@@ -985,7 +985,7 @@
     </p:spTree>
     <p:extLst>
       <p:ext uri="{BB962C8B-B14F-4D97-AF65-F5344CB8AC3E}">
-        <p14:creationId xmlns:p14="http://schemas.microsoft.com/office/powerpoint/2010/main" val="2614756581"/>
+        <p14:creationId xmlns:p14="http://schemas.microsoft.com/office/powerpoint/2010/main" val="688465585"/>
       </p:ext>
     </p:extLst>
   </p:cSld>
@@ -1094,7 +1094,7 @@
     </p:spTree>
     <p:extLst>
       <p:ext uri="{BB962C8B-B14F-4D97-AF65-F5344CB8AC3E}">
-        <p14:creationId xmlns:p14="http://schemas.microsoft.com/office/powerpoint/2010/main" val="1857412440"/>
+        <p14:creationId xmlns:p14="http://schemas.microsoft.com/office/powerpoint/2010/main" val="1747380966"/>
       </p:ext>
     </p:extLst>
   </p:cSld>
@@ -1203,7 +1203,7 @@
     </p:spTree>
     <p:extLst>
       <p:ext uri="{BB962C8B-B14F-4D97-AF65-F5344CB8AC3E}">
-        <p14:creationId xmlns:p14="http://schemas.microsoft.com/office/powerpoint/2010/main" val="3415178486"/>
+        <p14:creationId xmlns:p14="http://schemas.microsoft.com/office/powerpoint/2010/main" val="3542698576"/>
       </p:ext>
     </p:extLst>
   </p:cSld>
@@ -1312,7 +1312,7 @@
     </p:spTree>
     <p:extLst>
       <p:ext uri="{BB962C8B-B14F-4D97-AF65-F5344CB8AC3E}">
-        <p14:creationId xmlns:p14="http://schemas.microsoft.com/office/powerpoint/2010/main" val="2418241064"/>
+        <p14:creationId xmlns:p14="http://schemas.microsoft.com/office/powerpoint/2010/main" val="1602959421"/>
       </p:ext>
     </p:extLst>
   </p:cSld>
@@ -1421,7 +1421,7 @@
     </p:spTree>
     <p:extLst>
       <p:ext uri="{BB962C8B-B14F-4D97-AF65-F5344CB8AC3E}">
-        <p14:creationId xmlns:p14="http://schemas.microsoft.com/office/powerpoint/2010/main" val="2163143122"/>
+        <p14:creationId xmlns:p14="http://schemas.microsoft.com/office/powerpoint/2010/main" val="3516812312"/>
       </p:ext>
     </p:extLst>
   </p:cSld>
@@ -1530,7 +1530,7 @@
     </p:spTree>
     <p:extLst>
       <p:ext uri="{BB962C8B-B14F-4D97-AF65-F5344CB8AC3E}">
-        <p14:creationId xmlns:p14="http://schemas.microsoft.com/office/powerpoint/2010/main" val="688465585"/>
+        <p14:creationId xmlns:p14="http://schemas.microsoft.com/office/powerpoint/2010/main" val="3072025035"/>
       </p:ext>
     </p:extLst>
   </p:cSld>
@@ -1639,7 +1639,7 @@
     </p:spTree>
     <p:extLst>
       <p:ext uri="{BB962C8B-B14F-4D97-AF65-F5344CB8AC3E}">
-        <p14:creationId xmlns:p14="http://schemas.microsoft.com/office/powerpoint/2010/main" val="1747380966"/>
+        <p14:creationId xmlns:p14="http://schemas.microsoft.com/office/powerpoint/2010/main" val="3567871064"/>
       </p:ext>
     </p:extLst>
   </p:cSld>
@@ -1748,7 +1748,7 @@
     </p:spTree>
     <p:extLst>
       <p:ext uri="{BB962C8B-B14F-4D97-AF65-F5344CB8AC3E}">
-        <p14:creationId xmlns:p14="http://schemas.microsoft.com/office/powerpoint/2010/main" val="1602959421"/>
+        <p14:creationId xmlns:p14="http://schemas.microsoft.com/office/powerpoint/2010/main" val="1433842641"/>
       </p:ext>
     </p:extLst>
   </p:cSld>
@@ -1857,7 +1857,7 @@
     </p:spTree>
     <p:extLst>
       <p:ext uri="{BB962C8B-B14F-4D97-AF65-F5344CB8AC3E}">
-        <p14:creationId xmlns:p14="http://schemas.microsoft.com/office/powerpoint/2010/main" val="3567871064"/>
+        <p14:creationId xmlns:p14="http://schemas.microsoft.com/office/powerpoint/2010/main" val="2614756581"/>
       </p:ext>
     </p:extLst>
   </p:cSld>
@@ -2070,7 +2070,7 @@
     </p:spTree>
     <p:extLst>
       <p:ext uri="{BB962C8B-B14F-4D97-AF65-F5344CB8AC3E}">
-        <p14:creationId xmlns:p14="http://schemas.microsoft.com/office/powerpoint/2010/main" val="1433842641"/>
+        <p14:creationId xmlns:p14="http://schemas.microsoft.com/office/powerpoint/2010/main" val="1857412440"/>
       </p:ext>
     </p:extLst>
   </p:cSld>
@@ -3051,7 +3051,7 @@
     </p:spTree>
     <p:extLst>
       <p:ext uri="{BB962C8B-B14F-4D97-AF65-F5344CB8AC3E}">
-        <p14:creationId xmlns:p14="http://schemas.microsoft.com/office/powerpoint/2010/main" val="3542698576"/>
+        <p14:creationId xmlns:p14="http://schemas.microsoft.com/office/powerpoint/2010/main" val="3415178486"/>
       </p:ext>
     </p:extLst>
   </p:cSld>
@@ -3160,7 +3160,7 @@
     </p:spTree>
     <p:extLst>
       <p:ext uri="{BB962C8B-B14F-4D97-AF65-F5344CB8AC3E}">
-        <p14:creationId xmlns:p14="http://schemas.microsoft.com/office/powerpoint/2010/main" val="3516812312"/>
+        <p14:creationId xmlns:p14="http://schemas.microsoft.com/office/powerpoint/2010/main" val="2418241064"/>
       </p:ext>
     </p:extLst>
   </p:cSld>
@@ -3396,7 +3396,7 @@
           <a:p>
             <a:fld id="{4BDF68E2-58F2-4D09-BE8B-E3BD06533059}" type="datetimeFigureOut">
               <a:rPr lang="en-US" dirty="0"/>
-              <a:t>11/22/2019</a:t>
+              <a:t>12/3/2019</a:t>
             </a:fld>
             <a:endParaRPr lang="en-US" dirty="0"/>
           </a:p>
@@ -3614,7 +3614,7 @@
           <a:p>
             <a:fld id="{2E2D6473-DF6D-4702-B328-E0DD40540A4E}" type="datetimeFigureOut">
               <a:rPr lang="en-US" dirty="0"/>
-              <a:t>11/22/2019</a:t>
+              <a:t>12/3/2019</a:t>
             </a:fld>
             <a:endParaRPr lang="en-US" dirty="0"/>
           </a:p>
@@ -3880,7 +3880,7 @@
           <a:p>
             <a:fld id="{E26F7E3A-B166-407D-9866-32884E7D5B37}" type="datetimeFigureOut">
               <a:rPr lang="en-US" dirty="0"/>
-              <a:t>11/22/2019</a:t>
+              <a:t>12/3/2019</a:t>
             </a:fld>
             <a:endParaRPr lang="en-US" dirty="0"/>
           </a:p>
@@ -4922,7 +4922,7 @@
           <a:p>
             <a:fld id="{528FC5F6-F338-4AE4-BB23-26385BCFC423}" type="datetimeFigureOut">
               <a:rPr lang="en-US" dirty="0"/>
-              <a:t>11/22/2019</a:t>
+              <a:t>12/3/2019</a:t>
             </a:fld>
             <a:endParaRPr lang="en-US" dirty="0"/>
           </a:p>
@@ -5275,7 +5275,7 @@
           <a:p>
             <a:fld id="{20EBB0C4-6273-4C6E-B9BD-2EDC30F1CD52}" type="datetimeFigureOut">
               <a:rPr lang="en-US" dirty="0"/>
-              <a:t>11/22/2019</a:t>
+              <a:t>12/3/2019</a:t>
             </a:fld>
             <a:endParaRPr lang="en-US" dirty="0"/>
           </a:p>
@@ -5560,7 +5560,7 @@
           <a:p>
             <a:fld id="{19AB4D41-86C1-4908-B66A-0B50CEB3BF29}" type="datetimeFigureOut">
               <a:rPr lang="en-US" dirty="0"/>
-              <a:t>11/22/2019</a:t>
+              <a:t>12/3/2019</a:t>
             </a:fld>
             <a:endParaRPr lang="en-US" dirty="0"/>
           </a:p>
@@ -5949,7 +5949,7 @@
           <a:p>
             <a:fld id="{E6426E2C-56C1-4E0D-A793-0088A7FDD37E}" type="datetimeFigureOut">
               <a:rPr lang="en-US" dirty="0"/>
-              <a:t>11/22/2019</a:t>
+              <a:t>12/3/2019</a:t>
             </a:fld>
             <a:endParaRPr lang="en-US" dirty="0"/>
           </a:p>
@@ -6077,7 +6077,7 @@
           <a:p>
             <a:fld id="{C8C39B41-D8B5-4052-B551-9B5525EAA8B6}" type="datetimeFigureOut">
               <a:rPr lang="en-US" dirty="0"/>
-              <a:t>11/22/2019</a:t>
+              <a:t>12/3/2019</a:t>
             </a:fld>
             <a:endParaRPr lang="en-US" dirty="0"/>
           </a:p>
@@ -6258,7 +6258,7 @@
           <a:p>
             <a:fld id="{4D94136C-8742-45B2-AF27-D93DF72833A9}" type="datetimeFigureOut">
               <a:rPr lang="en-US" dirty="0"/>
-              <a:t>11/22/2019</a:t>
+              <a:t>12/3/2019</a:t>
             </a:fld>
             <a:endParaRPr lang="en-US" dirty="0"/>
           </a:p>
@@ -6622,7 +6622,7 @@
           <a:p>
             <a:fld id="{32ABBEA6-7C60-4B02-AE87-00D78D8422AF}" type="datetimeFigureOut">
               <a:rPr lang="en-US" dirty="0"/>
-              <a:t>11/22/2019</a:t>
+              <a:t>12/3/2019</a:t>
             </a:fld>
             <a:endParaRPr lang="en-US" dirty="0"/>
           </a:p>
@@ -7014,7 +7014,7 @@
           <a:p>
             <a:fld id="{C9CAD897-D46E-4AD2-BD9B-49DD3E640873}" type="datetimeFigureOut">
               <a:rPr lang="en-US" dirty="0"/>
-              <a:t>11/22/2019</a:t>
+              <a:t>12/3/2019</a:t>
             </a:fld>
             <a:endParaRPr lang="en-US" dirty="0"/>
           </a:p>
@@ -7311,7 +7311,7 @@
           <a:p>
             <a:fld id="{98624D31-43A5-475A-80CF-332C9F6DCF35}" type="datetimeFigureOut">
               <a:rPr lang="en-US" dirty="0"/>
-              <a:t>11/22/2019</a:t>
+              <a:t>12/3/2019</a:t>
             </a:fld>
             <a:endParaRPr lang="en-US" dirty="0"/>
           </a:p>
@@ -7890,7 +7890,7 @@
               <a:t>Monitoramento com </a:t>
             </a:r>
             <a:r>
-              <a:rPr lang="pt-BR" sz="3800">
+              <a:rPr lang="pt-BR" sz="3800" dirty="0" err="1">
                 <a:latin typeface="Roboto" panose="02000000000000000000" pitchFamily="2" charset="0"/>
                 <a:ea typeface="Roboto" panose="02000000000000000000" pitchFamily="2" charset="0"/>
               </a:rPr>
@@ -7942,613 +7942,6 @@
 </file>
 
 <file path=ppt/slides/slide10.xml><?xml version="1.0" encoding="utf-8"?>
-<p:sld xmlns:a="http://schemas.openxmlformats.org/drawingml/2006/main" xmlns:r="http://schemas.openxmlformats.org/officeDocument/2006/relationships" xmlns:p="http://schemas.openxmlformats.org/presentationml/2006/main">
-  <p:cSld>
-    <p:spTree>
-      <p:nvGrpSpPr>
-        <p:cNvPr id="1" name="Shape 358"/>
-        <p:cNvGrpSpPr/>
-        <p:nvPr/>
-      </p:nvGrpSpPr>
-      <p:grpSpPr>
-        <a:xfrm>
-          <a:off x="0" y="0"/>
-          <a:ext cx="0" cy="0"/>
-          <a:chOff x="0" y="0"/>
-          <a:chExt cx="0" cy="0"/>
-        </a:xfrm>
-      </p:grpSpPr>
-      <p:pic>
-        <p:nvPicPr>
-          <p:cNvPr id="3" name="Imagem 2">
-            <a:extLst>
-              <a:ext uri="{FF2B5EF4-FFF2-40B4-BE49-F238E27FC236}">
-                <a16:creationId xmlns:a16="http://schemas.microsoft.com/office/drawing/2014/main" id="{0F252917-ECF4-442A-96AB-395EB7B14D10}"/>
-              </a:ext>
-            </a:extLst>
-          </p:cNvPr>
-          <p:cNvPicPr>
-            <a:picLocks noChangeAspect="1"/>
-          </p:cNvPicPr>
-          <p:nvPr/>
-        </p:nvPicPr>
-        <p:blipFill>
-          <a:blip r:embed="rId3"/>
-          <a:srcRect/>
-          <a:stretch/>
-        </p:blipFill>
-        <p:spPr>
-          <a:xfrm>
-            <a:off x="1095042" y="431150"/>
-            <a:ext cx="6953915" cy="4174408"/>
-          </a:xfrm>
-          <a:prstGeom prst="rect">
-            <a:avLst/>
-          </a:prstGeom>
-        </p:spPr>
-      </p:pic>
-    </p:spTree>
-    <p:extLst>
-      <p:ext uri="{BB962C8B-B14F-4D97-AF65-F5344CB8AC3E}">
-        <p14:creationId xmlns:p14="http://schemas.microsoft.com/office/powerpoint/2010/main" val="2823612099"/>
-      </p:ext>
-    </p:extLst>
-  </p:cSld>
-  <p:clrMapOvr>
-    <a:masterClrMapping/>
-  </p:clrMapOvr>
-</p:sld>
-</file>
-
-<file path=ppt/slides/slide11.xml><?xml version="1.0" encoding="utf-8"?>
-<p:sld xmlns:a="http://schemas.openxmlformats.org/drawingml/2006/main" xmlns:r="http://schemas.openxmlformats.org/officeDocument/2006/relationships" xmlns:p="http://schemas.openxmlformats.org/presentationml/2006/main">
-  <p:cSld>
-    <p:spTree>
-      <p:nvGrpSpPr>
-        <p:cNvPr id="1" name="Shape 358"/>
-        <p:cNvGrpSpPr/>
-        <p:nvPr/>
-      </p:nvGrpSpPr>
-      <p:grpSpPr>
-        <a:xfrm>
-          <a:off x="0" y="0"/>
-          <a:ext cx="0" cy="0"/>
-          <a:chOff x="0" y="0"/>
-          <a:chExt cx="0" cy="0"/>
-        </a:xfrm>
-      </p:grpSpPr>
-      <p:pic>
-        <p:nvPicPr>
-          <p:cNvPr id="3" name="Imagem 2">
-            <a:extLst>
-              <a:ext uri="{FF2B5EF4-FFF2-40B4-BE49-F238E27FC236}">
-                <a16:creationId xmlns:a16="http://schemas.microsoft.com/office/drawing/2014/main" id="{0F252917-ECF4-442A-96AB-395EB7B14D10}"/>
-              </a:ext>
-            </a:extLst>
-          </p:cNvPr>
-          <p:cNvPicPr>
-            <a:picLocks noChangeAspect="1"/>
-          </p:cNvPicPr>
-          <p:nvPr/>
-        </p:nvPicPr>
-        <p:blipFill>
-          <a:blip r:embed="rId3"/>
-          <a:srcRect/>
-          <a:stretch/>
-        </p:blipFill>
-        <p:spPr>
-          <a:xfrm>
-            <a:off x="1095042" y="431150"/>
-            <a:ext cx="6953915" cy="4174408"/>
-          </a:xfrm>
-          <a:prstGeom prst="rect">
-            <a:avLst/>
-          </a:prstGeom>
-        </p:spPr>
-      </p:pic>
-    </p:spTree>
-    <p:extLst>
-      <p:ext uri="{BB962C8B-B14F-4D97-AF65-F5344CB8AC3E}">
-        <p14:creationId xmlns:p14="http://schemas.microsoft.com/office/powerpoint/2010/main" val="4292202780"/>
-      </p:ext>
-    </p:extLst>
-  </p:cSld>
-  <p:clrMapOvr>
-    <a:masterClrMapping/>
-  </p:clrMapOvr>
-</p:sld>
-</file>
-
-<file path=ppt/slides/slide12.xml><?xml version="1.0" encoding="utf-8"?>
-<p:sld xmlns:a="http://schemas.openxmlformats.org/drawingml/2006/main" xmlns:r="http://schemas.openxmlformats.org/officeDocument/2006/relationships" xmlns:p="http://schemas.openxmlformats.org/presentationml/2006/main">
-  <p:cSld>
-    <p:spTree>
-      <p:nvGrpSpPr>
-        <p:cNvPr id="1" name="Shape 358"/>
-        <p:cNvGrpSpPr/>
-        <p:nvPr/>
-      </p:nvGrpSpPr>
-      <p:grpSpPr>
-        <a:xfrm>
-          <a:off x="0" y="0"/>
-          <a:ext cx="0" cy="0"/>
-          <a:chOff x="0" y="0"/>
-          <a:chExt cx="0" cy="0"/>
-        </a:xfrm>
-      </p:grpSpPr>
-      <p:pic>
-        <p:nvPicPr>
-          <p:cNvPr id="3" name="Imagem 2">
-            <a:extLst>
-              <a:ext uri="{FF2B5EF4-FFF2-40B4-BE49-F238E27FC236}">
-                <a16:creationId xmlns:a16="http://schemas.microsoft.com/office/drawing/2014/main" id="{0F252917-ECF4-442A-96AB-395EB7B14D10}"/>
-              </a:ext>
-            </a:extLst>
-          </p:cNvPr>
-          <p:cNvPicPr>
-            <a:picLocks noChangeAspect="1"/>
-          </p:cNvPicPr>
-          <p:nvPr/>
-        </p:nvPicPr>
-        <p:blipFill>
-          <a:blip r:embed="rId3"/>
-          <a:srcRect/>
-          <a:stretch/>
-        </p:blipFill>
-        <p:spPr>
-          <a:xfrm>
-            <a:off x="1095042" y="431150"/>
-            <a:ext cx="6953915" cy="4174408"/>
-          </a:xfrm>
-          <a:prstGeom prst="rect">
-            <a:avLst/>
-          </a:prstGeom>
-        </p:spPr>
-      </p:pic>
-    </p:spTree>
-    <p:extLst>
-      <p:ext uri="{BB962C8B-B14F-4D97-AF65-F5344CB8AC3E}">
-        <p14:creationId xmlns:p14="http://schemas.microsoft.com/office/powerpoint/2010/main" val="2467578592"/>
-      </p:ext>
-    </p:extLst>
-  </p:cSld>
-  <p:clrMapOvr>
-    <a:masterClrMapping/>
-  </p:clrMapOvr>
-</p:sld>
-</file>
-
-<file path=ppt/slides/slide13.xml><?xml version="1.0" encoding="utf-8"?>
-<p:sld xmlns:a="http://schemas.openxmlformats.org/drawingml/2006/main" xmlns:r="http://schemas.openxmlformats.org/officeDocument/2006/relationships" xmlns:p="http://schemas.openxmlformats.org/presentationml/2006/main">
-  <p:cSld>
-    <p:spTree>
-      <p:nvGrpSpPr>
-        <p:cNvPr id="1" name="Shape 358"/>
-        <p:cNvGrpSpPr/>
-        <p:nvPr/>
-      </p:nvGrpSpPr>
-      <p:grpSpPr>
-        <a:xfrm>
-          <a:off x="0" y="0"/>
-          <a:ext cx="0" cy="0"/>
-          <a:chOff x="0" y="0"/>
-          <a:chExt cx="0" cy="0"/>
-        </a:xfrm>
-      </p:grpSpPr>
-      <p:pic>
-        <p:nvPicPr>
-          <p:cNvPr id="6" name="Imagem 5">
-            <a:extLst>
-              <a:ext uri="{FF2B5EF4-FFF2-40B4-BE49-F238E27FC236}">
-                <a16:creationId xmlns:a16="http://schemas.microsoft.com/office/drawing/2014/main" id="{F8BD068C-A504-449C-82DF-58DB846F820B}"/>
-              </a:ext>
-            </a:extLst>
-          </p:cNvPr>
-          <p:cNvPicPr>
-            <a:picLocks noChangeAspect="1"/>
-          </p:cNvPicPr>
-          <p:nvPr/>
-        </p:nvPicPr>
-        <p:blipFill>
-          <a:blip r:embed="rId3"/>
-          <a:stretch>
-            <a:fillRect/>
-          </a:stretch>
-        </p:blipFill>
-        <p:spPr>
-          <a:xfrm>
-            <a:off x="2140764" y="1878106"/>
-            <a:ext cx="1481417" cy="1481417"/>
-          </a:xfrm>
-          <a:prstGeom prst="rect">
-            <a:avLst/>
-          </a:prstGeom>
-        </p:spPr>
-      </p:pic>
-      <p:pic>
-        <p:nvPicPr>
-          <p:cNvPr id="11" name="Imagem 10">
-            <a:extLst>
-              <a:ext uri="{FF2B5EF4-FFF2-40B4-BE49-F238E27FC236}">
-                <a16:creationId xmlns:a16="http://schemas.microsoft.com/office/drawing/2014/main" id="{D77014C1-FEF8-40EF-B2C9-452CE2CD4033}"/>
-              </a:ext>
-            </a:extLst>
-          </p:cNvPr>
-          <p:cNvPicPr>
-            <a:picLocks noChangeAspect="1"/>
-          </p:cNvPicPr>
-          <p:nvPr/>
-        </p:nvPicPr>
-        <p:blipFill>
-          <a:blip r:embed="rId4"/>
-          <a:stretch>
-            <a:fillRect/>
-          </a:stretch>
-        </p:blipFill>
-        <p:spPr>
-          <a:xfrm>
-            <a:off x="5677232" y="1912844"/>
-            <a:ext cx="1424350" cy="1411940"/>
-          </a:xfrm>
-          <a:prstGeom prst="rect">
-            <a:avLst/>
-          </a:prstGeom>
-        </p:spPr>
-      </p:pic>
-      <p:sp>
-        <p:nvSpPr>
-          <p:cNvPr id="12" name="CaixaDeTexto 11">
-            <a:extLst>
-              <a:ext uri="{FF2B5EF4-FFF2-40B4-BE49-F238E27FC236}">
-                <a16:creationId xmlns:a16="http://schemas.microsoft.com/office/drawing/2014/main" id="{F5905E5D-35C0-46CA-A27A-B82B04576DBF}"/>
-              </a:ext>
-            </a:extLst>
-          </p:cNvPr>
-          <p:cNvSpPr txBox="1"/>
-          <p:nvPr/>
-        </p:nvSpPr>
-        <p:spPr>
-          <a:xfrm>
-            <a:off x="2881473" y="645459"/>
-            <a:ext cx="3381054" cy="584775"/>
-          </a:xfrm>
-          <a:prstGeom prst="rect">
-            <a:avLst/>
-          </a:prstGeom>
-          <a:noFill/>
-        </p:spPr>
-        <p:txBody>
-          <a:bodyPr wrap="none" rtlCol="0">
-            <a:spAutoFit/>
-          </a:bodyPr>
-          <a:lstStyle/>
-          <a:p>
-            <a:r>
-              <a:rPr lang="en-US" sz="3200" b="1" dirty="0">
-                <a:latin typeface="Roboto" panose="02000000000000000000" pitchFamily="2" charset="0"/>
-                <a:ea typeface="Roboto" panose="02000000000000000000" pitchFamily="2" charset="0"/>
-              </a:rPr>
-              <a:t>Coleta dos dados</a:t>
-            </a:r>
-            <a:endParaRPr lang="pt-BR" sz="3200" b="1" dirty="0">
-              <a:latin typeface="Roboto" panose="02000000000000000000" pitchFamily="2" charset="0"/>
-              <a:ea typeface="Roboto" panose="02000000000000000000" pitchFamily="2" charset="0"/>
-            </a:endParaRPr>
-          </a:p>
-        </p:txBody>
-      </p:sp>
-      <p:pic>
-        <p:nvPicPr>
-          <p:cNvPr id="14" name="Imagem 13">
-            <a:extLst>
-              <a:ext uri="{FF2B5EF4-FFF2-40B4-BE49-F238E27FC236}">
-                <a16:creationId xmlns:a16="http://schemas.microsoft.com/office/drawing/2014/main" id="{4BFDA0D3-1A57-4E17-8B8B-215BC6D9E7F4}"/>
-              </a:ext>
-            </a:extLst>
-          </p:cNvPr>
-          <p:cNvPicPr>
-            <a:picLocks noChangeAspect="1"/>
-          </p:cNvPicPr>
-          <p:nvPr/>
-        </p:nvPicPr>
-        <p:blipFill>
-          <a:blip r:embed="rId5"/>
-          <a:stretch>
-            <a:fillRect/>
-          </a:stretch>
-        </p:blipFill>
-        <p:spPr>
-          <a:xfrm>
-            <a:off x="3168343" y="2257424"/>
-            <a:ext cx="722780" cy="722780"/>
-          </a:xfrm>
-          <a:prstGeom prst="rect">
-            <a:avLst/>
-          </a:prstGeom>
-        </p:spPr>
-      </p:pic>
-      <p:sp>
-        <p:nvSpPr>
-          <p:cNvPr id="15" name="Seta: para a Direita 14">
-            <a:extLst>
-              <a:ext uri="{FF2B5EF4-FFF2-40B4-BE49-F238E27FC236}">
-                <a16:creationId xmlns:a16="http://schemas.microsoft.com/office/drawing/2014/main" id="{A3CF5F5D-337E-418B-9E33-1AFDA75E1833}"/>
-              </a:ext>
-            </a:extLst>
-          </p:cNvPr>
-          <p:cNvSpPr/>
-          <p:nvPr/>
-        </p:nvSpPr>
-        <p:spPr>
-          <a:xfrm rot="10800000">
-            <a:off x="3897846" y="2660275"/>
-            <a:ext cx="1580029" cy="123265"/>
-          </a:xfrm>
-          <a:prstGeom prst="rightArrow">
-            <a:avLst/>
-          </a:prstGeom>
-        </p:spPr>
-        <p:style>
-          <a:lnRef idx="2">
-            <a:schemeClr val="accent1">
-              <a:shade val="50000"/>
-            </a:schemeClr>
-          </a:lnRef>
-          <a:fillRef idx="1">
-            <a:schemeClr val="accent1"/>
-          </a:fillRef>
-          <a:effectRef idx="0">
-            <a:schemeClr val="accent1"/>
-          </a:effectRef>
-          <a:fontRef idx="minor">
-            <a:schemeClr val="lt1"/>
-          </a:fontRef>
-        </p:style>
-        <p:txBody>
-          <a:bodyPr rtlCol="0" anchor="ctr"/>
-          <a:lstStyle/>
-          <a:p>
-            <a:pPr algn="ctr"/>
-            <a:endParaRPr lang="pt-BR"/>
-          </a:p>
-        </p:txBody>
-      </p:sp>
-    </p:spTree>
-    <p:extLst>
-      <p:ext uri="{BB962C8B-B14F-4D97-AF65-F5344CB8AC3E}">
-        <p14:creationId xmlns:p14="http://schemas.microsoft.com/office/powerpoint/2010/main" val="2267687944"/>
-      </p:ext>
-    </p:extLst>
-  </p:cSld>
-  <p:clrMapOvr>
-    <a:masterClrMapping/>
-  </p:clrMapOvr>
-  <p:timing>
-    <p:tnLst>
-      <p:par>
-        <p:cTn id="1" dur="indefinite" restart="never" nodeType="tmRoot">
-          <p:childTnLst>
-            <p:seq concurrent="1" nextAc="seek">
-              <p:cTn id="2" dur="indefinite" nodeType="mainSeq">
-                <p:childTnLst>
-                  <p:par>
-                    <p:cTn id="3" fill="hold">
-                      <p:stCondLst>
-                        <p:cond delay="indefinite"/>
-                      </p:stCondLst>
-                      <p:childTnLst>
-                        <p:par>
-                          <p:cTn id="4" fill="hold">
-                            <p:stCondLst>
-                              <p:cond delay="0"/>
-                            </p:stCondLst>
-                            <p:childTnLst>
-                              <p:par>
-                                <p:cTn id="5" presetID="1" presetClass="entr" presetSubtype="0" fill="hold" grpId="0" nodeType="clickEffect">
-                                  <p:stCondLst>
-                                    <p:cond delay="0"/>
-                                  </p:stCondLst>
-                                  <p:childTnLst>
-                                    <p:set>
-                                      <p:cBhvr>
-                                        <p:cTn id="6" dur="1" fill="hold">
-                                          <p:stCondLst>
-                                            <p:cond delay="0"/>
-                                          </p:stCondLst>
-                                        </p:cTn>
-                                        <p:tgtEl>
-                                          <p:spTgt spid="15"/>
-                                        </p:tgtEl>
-                                        <p:attrNameLst>
-                                          <p:attrName>style.visibility</p:attrName>
-                                        </p:attrNameLst>
-                                      </p:cBhvr>
-                                      <p:to>
-                                        <p:strVal val="visible"/>
-                                      </p:to>
-                                    </p:set>
-                                  </p:childTnLst>
-                                </p:cTn>
-                              </p:par>
-                            </p:childTnLst>
-                          </p:cTn>
-                        </p:par>
-                      </p:childTnLst>
-                    </p:cTn>
-                  </p:par>
-                  <p:par>
-                    <p:cTn id="7" fill="hold">
-                      <p:stCondLst>
-                        <p:cond delay="indefinite"/>
-                      </p:stCondLst>
-                      <p:childTnLst>
-                        <p:par>
-                          <p:cTn id="8" fill="hold">
-                            <p:stCondLst>
-                              <p:cond delay="0"/>
-                            </p:stCondLst>
-                            <p:childTnLst>
-                              <p:par>
-                                <p:cTn id="9" presetID="1" presetClass="entr" presetSubtype="0" fill="hold" nodeType="clickEffect">
-                                  <p:stCondLst>
-                                    <p:cond delay="0"/>
-                                  </p:stCondLst>
-                                  <p:childTnLst>
-                                    <p:set>
-                                      <p:cBhvr>
-                                        <p:cTn id="10" dur="1" fill="hold">
-                                          <p:stCondLst>
-                                            <p:cond delay="0"/>
-                                          </p:stCondLst>
-                                        </p:cTn>
-                                        <p:tgtEl>
-                                          <p:spTgt spid="14"/>
-                                        </p:tgtEl>
-                                        <p:attrNameLst>
-                                          <p:attrName>style.visibility</p:attrName>
-                                        </p:attrNameLst>
-                                      </p:cBhvr>
-                                      <p:to>
-                                        <p:strVal val="visible"/>
-                                      </p:to>
-                                    </p:set>
-                                  </p:childTnLst>
-                                </p:cTn>
-                              </p:par>
-                            </p:childTnLst>
-                          </p:cTn>
-                        </p:par>
-                      </p:childTnLst>
-                    </p:cTn>
-                  </p:par>
-                  <p:par>
-                    <p:cTn id="11" fill="hold">
-                      <p:stCondLst>
-                        <p:cond delay="indefinite"/>
-                      </p:stCondLst>
-                      <p:childTnLst>
-                        <p:par>
-                          <p:cTn id="12" fill="hold">
-                            <p:stCondLst>
-                              <p:cond delay="0"/>
-                            </p:stCondLst>
-                            <p:childTnLst>
-                              <p:par>
-                                <p:cTn id="13" presetID="63" presetClass="path" presetSubtype="0" accel="50000" decel="50000" fill="hold" nodeType="clickEffect">
-                                  <p:stCondLst>
-                                    <p:cond delay="0"/>
-                                  </p:stCondLst>
-                                  <p:childTnLst>
-                                    <p:animMotion origin="layout" path="M 0 0 L 0.25 0 E" pathEditMode="relative" ptsTypes="">
-                                      <p:cBhvr>
-                                        <p:cTn id="14" dur="2000" fill="hold"/>
-                                        <p:tgtEl>
-                                          <p:spTgt spid="14"/>
-                                        </p:tgtEl>
-                                        <p:attrNameLst>
-                                          <p:attrName>ppt_x</p:attrName>
-                                          <p:attrName>ppt_y</p:attrName>
-                                        </p:attrNameLst>
-                                      </p:cBhvr>
-                                    </p:animMotion>
-                                  </p:childTnLst>
-                                </p:cTn>
-                              </p:par>
-                            </p:childTnLst>
-                          </p:cTn>
-                        </p:par>
-                      </p:childTnLst>
-                    </p:cTn>
-                  </p:par>
-                </p:childTnLst>
-              </p:cTn>
-              <p:prevCondLst>
-                <p:cond evt="onPrev" delay="0">
-                  <p:tgtEl>
-                    <p:sldTgt/>
-                  </p:tgtEl>
-                </p:cond>
-              </p:prevCondLst>
-              <p:nextCondLst>
-                <p:cond evt="onNext" delay="0">
-                  <p:tgtEl>
-                    <p:sldTgt/>
-                  </p:tgtEl>
-                </p:cond>
-              </p:nextCondLst>
-            </p:seq>
-          </p:childTnLst>
-        </p:cTn>
-      </p:par>
-    </p:tnLst>
-    <p:bldLst>
-      <p:bldP spid="15" grpId="0" animBg="1"/>
-    </p:bldLst>
-  </p:timing>
-</p:sld>
-</file>
-
-<file path=ppt/slides/slide14.xml><?xml version="1.0" encoding="utf-8"?>
-<p:sld xmlns:a="http://schemas.openxmlformats.org/drawingml/2006/main" xmlns:r="http://schemas.openxmlformats.org/officeDocument/2006/relationships" xmlns:p="http://schemas.openxmlformats.org/presentationml/2006/main">
-  <p:cSld>
-    <p:spTree>
-      <p:nvGrpSpPr>
-        <p:cNvPr id="1" name="Shape 358"/>
-        <p:cNvGrpSpPr/>
-        <p:nvPr/>
-      </p:nvGrpSpPr>
-      <p:grpSpPr>
-        <a:xfrm>
-          <a:off x="0" y="0"/>
-          <a:ext cx="0" cy="0"/>
-          <a:chOff x="0" y="0"/>
-          <a:chExt cx="0" cy="0"/>
-        </a:xfrm>
-      </p:grpSpPr>
-      <p:pic>
-        <p:nvPicPr>
-          <p:cNvPr id="5" name="Imagem 4">
-            <a:extLst>
-              <a:ext uri="{FF2B5EF4-FFF2-40B4-BE49-F238E27FC236}">
-                <a16:creationId xmlns:a16="http://schemas.microsoft.com/office/drawing/2014/main" id="{6B5FD55F-B714-42CA-8BF8-C7B0AF138695}"/>
-              </a:ext>
-            </a:extLst>
-          </p:cNvPr>
-          <p:cNvPicPr>
-            <a:picLocks noChangeAspect="1"/>
-          </p:cNvPicPr>
-          <p:nvPr/>
-        </p:nvPicPr>
-        <p:blipFill>
-          <a:blip r:embed="rId3"/>
-          <a:stretch>
-            <a:fillRect/>
-          </a:stretch>
-        </p:blipFill>
-        <p:spPr>
-          <a:xfrm>
-            <a:off x="1660711" y="205907"/>
-            <a:ext cx="5943600" cy="4314825"/>
-          </a:xfrm>
-          <a:prstGeom prst="rect">
-            <a:avLst/>
-          </a:prstGeom>
-        </p:spPr>
-      </p:pic>
-    </p:spTree>
-    <p:extLst>
-      <p:ext uri="{BB962C8B-B14F-4D97-AF65-F5344CB8AC3E}">
-        <p14:creationId xmlns:p14="http://schemas.microsoft.com/office/powerpoint/2010/main" val="43124614"/>
-      </p:ext>
-    </p:extLst>
-  </p:cSld>
-  <p:clrMapOvr>
-    <a:masterClrMapping/>
-  </p:clrMapOvr>
-</p:sld>
-</file>
-
-<file path=ppt/slides/slide15.xml><?xml version="1.0" encoding="utf-8"?>
 <p:sld xmlns:a="http://schemas.openxmlformats.org/drawingml/2006/main" xmlns:r="http://schemas.openxmlformats.org/officeDocument/2006/relationships" xmlns:p="http://schemas.openxmlformats.org/presentationml/2006/main">
   <p:cSld>
     <p:spTree>
@@ -9085,7 +8478,7 @@
 </p:sld>
 </file>
 
-<file path=ppt/slides/slide16.xml><?xml version="1.0" encoding="utf-8"?>
+<file path=ppt/slides/slide11.xml><?xml version="1.0" encoding="utf-8"?>
 <p:sld xmlns:a="http://schemas.openxmlformats.org/drawingml/2006/main" xmlns:r="http://schemas.openxmlformats.org/officeDocument/2006/relationships" xmlns:p="http://schemas.openxmlformats.org/presentationml/2006/main">
   <p:cSld>
     <p:spTree>
@@ -9265,7 +8658,7 @@
 </p:sld>
 </file>
 
-<file path=ppt/slides/slide17.xml><?xml version="1.0" encoding="utf-8"?>
+<file path=ppt/slides/slide12.xml><?xml version="1.0" encoding="utf-8"?>
 <p:sld xmlns:a="http://schemas.openxmlformats.org/drawingml/2006/main" xmlns:r="http://schemas.openxmlformats.org/officeDocument/2006/relationships" xmlns:p="http://schemas.openxmlformats.org/presentationml/2006/main">
   <p:cSld>
     <p:spTree>
@@ -10804,7 +10197,66 @@
 </p:sld>
 </file>
 
-<file path=ppt/slides/slide18.xml><?xml version="1.0" encoding="utf-8"?>
+<file path=ppt/slides/slide13.xml><?xml version="1.0" encoding="utf-8"?>
+<p:sld xmlns:a="http://schemas.openxmlformats.org/drawingml/2006/main" xmlns:r="http://schemas.openxmlformats.org/officeDocument/2006/relationships" xmlns:p="http://schemas.openxmlformats.org/presentationml/2006/main">
+  <p:cSld>
+    <p:spTree>
+      <p:nvGrpSpPr>
+        <p:cNvPr id="1" name="Shape 358"/>
+        <p:cNvGrpSpPr/>
+        <p:nvPr/>
+      </p:nvGrpSpPr>
+      <p:grpSpPr>
+        <a:xfrm>
+          <a:off x="0" y="0"/>
+          <a:ext cx="0" cy="0"/>
+          <a:chOff x="0" y="0"/>
+          <a:chExt cx="0" cy="0"/>
+        </a:xfrm>
+      </p:grpSpPr>
+      <p:pic>
+        <p:nvPicPr>
+          <p:cNvPr id="3" name="Imagem 2">
+            <a:extLst>
+              <a:ext uri="{FF2B5EF4-FFF2-40B4-BE49-F238E27FC236}">
+                <a16:creationId xmlns:a16="http://schemas.microsoft.com/office/drawing/2014/main" id="{0F252917-ECF4-442A-96AB-395EB7B14D10}"/>
+              </a:ext>
+            </a:extLst>
+          </p:cNvPr>
+          <p:cNvPicPr>
+            <a:picLocks noChangeAspect="1"/>
+          </p:cNvPicPr>
+          <p:nvPr/>
+        </p:nvPicPr>
+        <p:blipFill>
+          <a:blip r:embed="rId3"/>
+          <a:srcRect/>
+          <a:stretch/>
+        </p:blipFill>
+        <p:spPr>
+          <a:xfrm>
+            <a:off x="1095042" y="431150"/>
+            <a:ext cx="6953915" cy="4174408"/>
+          </a:xfrm>
+          <a:prstGeom prst="rect">
+            <a:avLst/>
+          </a:prstGeom>
+        </p:spPr>
+      </p:pic>
+    </p:spTree>
+    <p:extLst>
+      <p:ext uri="{BB962C8B-B14F-4D97-AF65-F5344CB8AC3E}">
+        <p14:creationId xmlns:p14="http://schemas.microsoft.com/office/powerpoint/2010/main" val="201540624"/>
+      </p:ext>
+    </p:extLst>
+  </p:cSld>
+  <p:clrMapOvr>
+    <a:masterClrMapping/>
+  </p:clrMapOvr>
+</p:sld>
+</file>
+
+<file path=ppt/slides/slide14.xml><?xml version="1.0" encoding="utf-8"?>
 <p:sld xmlns:a="http://schemas.openxmlformats.org/drawingml/2006/main" xmlns:r="http://schemas.openxmlformats.org/officeDocument/2006/relationships" xmlns:p="http://schemas.openxmlformats.org/presentationml/2006/main">
   <p:cSld>
     <p:spTree>
@@ -11369,7 +10821,125 @@
 </p:sld>
 </file>
 
-<file path=ppt/slides/slide19.xml><?xml version="1.0" encoding="utf-8"?>
+<file path=ppt/slides/slide15.xml><?xml version="1.0" encoding="utf-8"?>
+<p:sld xmlns:a="http://schemas.openxmlformats.org/drawingml/2006/main" xmlns:r="http://schemas.openxmlformats.org/officeDocument/2006/relationships" xmlns:p="http://schemas.openxmlformats.org/presentationml/2006/main">
+  <p:cSld>
+    <p:spTree>
+      <p:nvGrpSpPr>
+        <p:cNvPr id="1" name="Shape 358"/>
+        <p:cNvGrpSpPr/>
+        <p:nvPr/>
+      </p:nvGrpSpPr>
+      <p:grpSpPr>
+        <a:xfrm>
+          <a:off x="0" y="0"/>
+          <a:ext cx="0" cy="0"/>
+          <a:chOff x="0" y="0"/>
+          <a:chExt cx="0" cy="0"/>
+        </a:xfrm>
+      </p:grpSpPr>
+      <p:pic>
+        <p:nvPicPr>
+          <p:cNvPr id="3" name="Imagem 2">
+            <a:extLst>
+              <a:ext uri="{FF2B5EF4-FFF2-40B4-BE49-F238E27FC236}">
+                <a16:creationId xmlns:a16="http://schemas.microsoft.com/office/drawing/2014/main" id="{0F252917-ECF4-442A-96AB-395EB7B14D10}"/>
+              </a:ext>
+            </a:extLst>
+          </p:cNvPr>
+          <p:cNvPicPr>
+            <a:picLocks noChangeAspect="1"/>
+          </p:cNvPicPr>
+          <p:nvPr/>
+        </p:nvPicPr>
+        <p:blipFill>
+          <a:blip r:embed="rId3"/>
+          <a:srcRect/>
+          <a:stretch/>
+        </p:blipFill>
+        <p:spPr>
+          <a:xfrm>
+            <a:off x="1095042" y="431150"/>
+            <a:ext cx="6953915" cy="4174408"/>
+          </a:xfrm>
+          <a:prstGeom prst="rect">
+            <a:avLst/>
+          </a:prstGeom>
+        </p:spPr>
+      </p:pic>
+    </p:spTree>
+    <p:extLst>
+      <p:ext uri="{BB962C8B-B14F-4D97-AF65-F5344CB8AC3E}">
+        <p14:creationId xmlns:p14="http://schemas.microsoft.com/office/powerpoint/2010/main" val="3089370334"/>
+      </p:ext>
+    </p:extLst>
+  </p:cSld>
+  <p:clrMapOvr>
+    <a:masterClrMapping/>
+  </p:clrMapOvr>
+</p:sld>
+</file>
+
+<file path=ppt/slides/slide16.xml><?xml version="1.0" encoding="utf-8"?>
+<p:sld xmlns:a="http://schemas.openxmlformats.org/drawingml/2006/main" xmlns:r="http://schemas.openxmlformats.org/officeDocument/2006/relationships" xmlns:p="http://schemas.openxmlformats.org/presentationml/2006/main">
+  <p:cSld>
+    <p:spTree>
+      <p:nvGrpSpPr>
+        <p:cNvPr id="1" name="Shape 358"/>
+        <p:cNvGrpSpPr/>
+        <p:nvPr/>
+      </p:nvGrpSpPr>
+      <p:grpSpPr>
+        <a:xfrm>
+          <a:off x="0" y="0"/>
+          <a:ext cx="0" cy="0"/>
+          <a:chOff x="0" y="0"/>
+          <a:chExt cx="0" cy="0"/>
+        </a:xfrm>
+      </p:grpSpPr>
+      <p:pic>
+        <p:nvPicPr>
+          <p:cNvPr id="3" name="Imagem 2">
+            <a:extLst>
+              <a:ext uri="{FF2B5EF4-FFF2-40B4-BE49-F238E27FC236}">
+                <a16:creationId xmlns:a16="http://schemas.microsoft.com/office/drawing/2014/main" id="{0F252917-ECF4-442A-96AB-395EB7B14D10}"/>
+              </a:ext>
+            </a:extLst>
+          </p:cNvPr>
+          <p:cNvPicPr>
+            <a:picLocks noChangeAspect="1"/>
+          </p:cNvPicPr>
+          <p:nvPr/>
+        </p:nvPicPr>
+        <p:blipFill>
+          <a:blip r:embed="rId3"/>
+          <a:srcRect/>
+          <a:stretch/>
+        </p:blipFill>
+        <p:spPr>
+          <a:xfrm>
+            <a:off x="1095042" y="431150"/>
+            <a:ext cx="6953915" cy="4174408"/>
+          </a:xfrm>
+          <a:prstGeom prst="rect">
+            <a:avLst/>
+          </a:prstGeom>
+        </p:spPr>
+      </p:pic>
+    </p:spTree>
+    <p:extLst>
+      <p:ext uri="{BB962C8B-B14F-4D97-AF65-F5344CB8AC3E}">
+        <p14:creationId xmlns:p14="http://schemas.microsoft.com/office/powerpoint/2010/main" val="2823612099"/>
+      </p:ext>
+    </p:extLst>
+  </p:cSld>
+  <p:clrMapOvr>
+    <a:masterClrMapping/>
+  </p:clrMapOvr>
+</p:sld>
+</file>
+
+<file path=ppt/slides/slide17.xml><?xml version="1.0" encoding="utf-8"?>
 <p:sld xmlns:a="http://schemas.openxmlformats.org/drawingml/2006/main" xmlns:r="http://schemas.openxmlformats.org/officeDocument/2006/relationships" xmlns:p="http://schemas.openxmlformats.org/presentationml/2006/main">
   <p:cSld>
     <p:spTree>
@@ -11492,536 +11062,7 @@
 </p:sld>
 </file>
 
-<file path=ppt/slides/slide2.xml><?xml version="1.0" encoding="utf-8"?>
-<p:sld xmlns:a="http://schemas.openxmlformats.org/drawingml/2006/main" xmlns:r="http://schemas.openxmlformats.org/officeDocument/2006/relationships" xmlns:p="http://schemas.openxmlformats.org/presentationml/2006/main">
-  <p:cSld>
-    <p:spTree>
-      <p:nvGrpSpPr>
-        <p:cNvPr id="1" name="Shape 350"/>
-        <p:cNvGrpSpPr/>
-        <p:nvPr/>
-      </p:nvGrpSpPr>
-      <p:grpSpPr>
-        <a:xfrm>
-          <a:off x="0" y="0"/>
-          <a:ext cx="0" cy="0"/>
-          <a:chOff x="0" y="0"/>
-          <a:chExt cx="0" cy="0"/>
-        </a:xfrm>
-      </p:grpSpPr>
-      <p:sp>
-        <p:nvSpPr>
-          <p:cNvPr id="9" name="Google Shape;352;p13">
-            <a:extLst>
-              <a:ext uri="{FF2B5EF4-FFF2-40B4-BE49-F238E27FC236}">
-                <a16:creationId xmlns:a16="http://schemas.microsoft.com/office/drawing/2014/main" id="{1018BA2E-FDE0-4044-AA13-4C495BF1C438}"/>
-              </a:ext>
-            </a:extLst>
-          </p:cNvPr>
-          <p:cNvSpPr txBox="1">
-            <a:spLocks noGrp="1"/>
-          </p:cNvSpPr>
-          <p:nvPr>
-            <p:ph type="body" sz="half" idx="2"/>
-          </p:nvPr>
-        </p:nvSpPr>
-        <p:spPr>
-          <a:xfrm>
-            <a:off x="3310851" y="596534"/>
-            <a:ext cx="5496362" cy="1502430"/>
-          </a:xfrm>
-          <a:prstGeom prst="rect">
-            <a:avLst/>
-          </a:prstGeom>
-        </p:spPr>
-        <p:txBody>
-          <a:bodyPr spcFirstLastPara="1" wrap="square" lIns="91425" tIns="91425" rIns="91425" bIns="91425" anchor="t" anchorCtr="0">
-            <a:noAutofit/>
-          </a:bodyPr>
-          <a:lstStyle/>
-          <a:p>
-            <a:pPr marL="0" indent="0">
-              <a:lnSpc>
-                <a:spcPct val="85000"/>
-              </a:lnSpc>
-              <a:spcBef>
-                <a:spcPct val="0"/>
-              </a:spcBef>
-              <a:spcAft>
-                <a:spcPts val="0"/>
-              </a:spcAft>
-            </a:pPr>
-            <a:r>
-              <a:rPr lang="en-US" sz="4800" b="1" spc="-38" dirty="0" err="1">
-                <a:solidFill>
-                  <a:schemeClr val="tx1">
-                    <a:lumMod val="85000"/>
-                    <a:lumOff val="15000"/>
-                  </a:schemeClr>
-                </a:solidFill>
-                <a:latin typeface="Roboto" panose="02000000000000000000" pitchFamily="2" charset="0"/>
-                <a:ea typeface="Roboto" panose="02000000000000000000" pitchFamily="2" charset="0"/>
-                <a:cs typeface="+mj-cs"/>
-              </a:rPr>
-              <a:t>Fabrício</a:t>
-            </a:r>
-            <a:r>
-              <a:rPr lang="en-US" sz="4800" b="1" spc="-38" dirty="0">
-                <a:solidFill>
-                  <a:schemeClr val="tx1">
-                    <a:lumMod val="85000"/>
-                    <a:lumOff val="15000"/>
-                  </a:schemeClr>
-                </a:solidFill>
-                <a:latin typeface="Roboto" panose="02000000000000000000" pitchFamily="2" charset="0"/>
-                <a:ea typeface="Roboto" panose="02000000000000000000" pitchFamily="2" charset="0"/>
-                <a:cs typeface="+mj-cs"/>
-              </a:rPr>
-              <a:t> Veronez</a:t>
-            </a:r>
-            <a:endParaRPr sz="4800" b="1" spc="-38" dirty="0">
-              <a:solidFill>
-                <a:schemeClr val="tx1">
-                  <a:lumMod val="85000"/>
-                  <a:lumOff val="15000"/>
-                </a:schemeClr>
-              </a:solidFill>
-              <a:latin typeface="Roboto" panose="02000000000000000000" pitchFamily="2" charset="0"/>
-              <a:ea typeface="Roboto" panose="02000000000000000000" pitchFamily="2" charset="0"/>
-              <a:cs typeface="+mj-cs"/>
-            </a:endParaRPr>
-          </a:p>
-          <a:p>
-            <a:pPr marL="0" indent="0">
-              <a:lnSpc>
-                <a:spcPct val="85000"/>
-              </a:lnSpc>
-              <a:spcBef>
-                <a:spcPct val="0"/>
-              </a:spcBef>
-              <a:spcAft>
-                <a:spcPts val="0"/>
-              </a:spcAft>
-            </a:pPr>
-            <a:r>
-              <a:rPr lang="en-US" sz="3200" spc="-38" dirty="0" err="1">
-                <a:solidFill>
-                  <a:schemeClr val="tx1">
-                    <a:lumMod val="85000"/>
-                    <a:lumOff val="15000"/>
-                  </a:schemeClr>
-                </a:solidFill>
-                <a:latin typeface="Roboto" panose="02000000000000000000" pitchFamily="2" charset="0"/>
-                <a:ea typeface="Roboto" panose="02000000000000000000" pitchFamily="2" charset="0"/>
-                <a:cs typeface="+mj-cs"/>
-              </a:rPr>
-              <a:t>Arquiteto</a:t>
-            </a:r>
-            <a:r>
-              <a:rPr lang="en-US" sz="3200" spc="-38" dirty="0">
-                <a:solidFill>
-                  <a:schemeClr val="tx1">
-                    <a:lumMod val="85000"/>
-                    <a:lumOff val="15000"/>
-                  </a:schemeClr>
-                </a:solidFill>
-                <a:latin typeface="Roboto" panose="02000000000000000000" pitchFamily="2" charset="0"/>
-                <a:ea typeface="Roboto" panose="02000000000000000000" pitchFamily="2" charset="0"/>
-                <a:cs typeface="+mj-cs"/>
-              </a:rPr>
-              <a:t> de </a:t>
-            </a:r>
-            <a:r>
-              <a:rPr lang="en-US" sz="3200" spc="-38" dirty="0" err="1">
-                <a:solidFill>
-                  <a:schemeClr val="tx1">
-                    <a:lumMod val="85000"/>
-                    <a:lumOff val="15000"/>
-                  </a:schemeClr>
-                </a:solidFill>
-                <a:latin typeface="Roboto" panose="02000000000000000000" pitchFamily="2" charset="0"/>
-                <a:ea typeface="Roboto" panose="02000000000000000000" pitchFamily="2" charset="0"/>
-                <a:cs typeface="+mj-cs"/>
-              </a:rPr>
-              <a:t>Aplicações</a:t>
-            </a:r>
-            <a:endParaRPr sz="3200" spc="-38" dirty="0">
-              <a:solidFill>
-                <a:schemeClr val="tx1">
-                  <a:lumMod val="85000"/>
-                  <a:lumOff val="15000"/>
-                </a:schemeClr>
-              </a:solidFill>
-              <a:latin typeface="Roboto" panose="02000000000000000000" pitchFamily="2" charset="0"/>
-              <a:ea typeface="Roboto" panose="02000000000000000000" pitchFamily="2" charset="0"/>
-              <a:cs typeface="+mj-cs"/>
-            </a:endParaRPr>
-          </a:p>
-        </p:txBody>
-      </p:sp>
-      <p:sp>
-        <p:nvSpPr>
-          <p:cNvPr id="12" name="CaixaDeTexto 11">
-            <a:extLst>
-              <a:ext uri="{FF2B5EF4-FFF2-40B4-BE49-F238E27FC236}">
-                <a16:creationId xmlns:a16="http://schemas.microsoft.com/office/drawing/2014/main" id="{2CFE1A40-C45B-403D-8565-3D82BCD84EDC}"/>
-              </a:ext>
-            </a:extLst>
-          </p:cNvPr>
-          <p:cNvSpPr txBox="1"/>
-          <p:nvPr/>
-        </p:nvSpPr>
-        <p:spPr>
-          <a:xfrm>
-            <a:off x="3310851" y="3341722"/>
-            <a:ext cx="5649175" cy="1546577"/>
-          </a:xfrm>
-          <a:prstGeom prst="rect">
-            <a:avLst/>
-          </a:prstGeom>
-          <a:noFill/>
-        </p:spPr>
-        <p:txBody>
-          <a:bodyPr wrap="none" rtlCol="0">
-            <a:spAutoFit/>
-          </a:bodyPr>
-          <a:lstStyle/>
-          <a:p>
-            <a:pPr>
-              <a:lnSpc>
-                <a:spcPct val="85000"/>
-              </a:lnSpc>
-              <a:spcBef>
-                <a:spcPct val="0"/>
-              </a:spcBef>
-            </a:pPr>
-            <a:r>
-              <a:rPr lang="en-US" spc="-38" dirty="0">
-                <a:solidFill>
-                  <a:schemeClr val="tx1">
-                    <a:lumMod val="85000"/>
-                    <a:lumOff val="15000"/>
-                  </a:schemeClr>
-                </a:solidFill>
-                <a:ea typeface="Roboto" panose="02000000000000000000" pitchFamily="2" charset="0"/>
-              </a:rPr>
-              <a:t>YouTube – Fabricio Veronez</a:t>
-            </a:r>
-          </a:p>
-          <a:p>
-            <a:pPr>
-              <a:lnSpc>
-                <a:spcPct val="85000"/>
-              </a:lnSpc>
-              <a:spcBef>
-                <a:spcPct val="0"/>
-              </a:spcBef>
-            </a:pPr>
-            <a:r>
-              <a:rPr lang="en-US" spc="-38" dirty="0">
-                <a:solidFill>
-                  <a:schemeClr val="tx1">
-                    <a:lumMod val="85000"/>
-                    <a:lumOff val="15000"/>
-                  </a:schemeClr>
-                </a:solidFill>
-                <a:ea typeface="Roboto" panose="02000000000000000000" pitchFamily="2" charset="0"/>
-              </a:rPr>
-              <a:t>Email - </a:t>
-            </a:r>
-            <a:r>
-              <a:rPr lang="en-US" spc="-38" dirty="0">
-                <a:solidFill>
-                  <a:schemeClr val="tx1">
-                    <a:lumMod val="85000"/>
-                    <a:lumOff val="15000"/>
-                  </a:schemeClr>
-                </a:solidFill>
-                <a:ea typeface="Roboto" panose="02000000000000000000" pitchFamily="2" charset="0"/>
-                <a:hlinkClick r:id="rId3"/>
-              </a:rPr>
-              <a:t>fabricioveronez@gmail.com</a:t>
-            </a:r>
-            <a:endParaRPr lang="en-US" spc="-38" dirty="0">
-              <a:solidFill>
-                <a:schemeClr val="tx1">
-                  <a:lumMod val="85000"/>
-                  <a:lumOff val="15000"/>
-                </a:schemeClr>
-              </a:solidFill>
-              <a:ea typeface="Roboto" panose="02000000000000000000" pitchFamily="2" charset="0"/>
-            </a:endParaRPr>
-          </a:p>
-          <a:p>
-            <a:pPr>
-              <a:lnSpc>
-                <a:spcPct val="85000"/>
-              </a:lnSpc>
-              <a:spcBef>
-                <a:spcPct val="0"/>
-              </a:spcBef>
-            </a:pPr>
-            <a:r>
-              <a:rPr lang="en-US" spc="-38" dirty="0">
-                <a:solidFill>
-                  <a:schemeClr val="tx1">
-                    <a:lumMod val="85000"/>
-                    <a:lumOff val="15000"/>
-                  </a:schemeClr>
-                </a:solidFill>
-                <a:ea typeface="Roboto" panose="02000000000000000000" pitchFamily="2" charset="0"/>
-              </a:rPr>
-              <a:t>Facebook - </a:t>
-            </a:r>
-            <a:r>
-              <a:rPr lang="pt-BR" dirty="0">
-                <a:hlinkClick r:id="rId4"/>
-              </a:rPr>
-              <a:t>http://www.facebook.com/fabricioveronezdev/</a:t>
-            </a:r>
-            <a:endParaRPr lang="en-US" spc="-38" dirty="0">
-              <a:solidFill>
-                <a:schemeClr val="tx1">
-                  <a:lumMod val="85000"/>
-                  <a:lumOff val="15000"/>
-                </a:schemeClr>
-              </a:solidFill>
-              <a:ea typeface="Roboto" panose="02000000000000000000" pitchFamily="2" charset="0"/>
-            </a:endParaRPr>
-          </a:p>
-          <a:p>
-            <a:pPr>
-              <a:lnSpc>
-                <a:spcPct val="85000"/>
-              </a:lnSpc>
-              <a:spcBef>
-                <a:spcPct val="0"/>
-              </a:spcBef>
-            </a:pPr>
-            <a:r>
-              <a:rPr lang="en-US" spc="-38" dirty="0" err="1">
-                <a:solidFill>
-                  <a:schemeClr val="tx1">
-                    <a:lumMod val="85000"/>
-                    <a:lumOff val="15000"/>
-                  </a:schemeClr>
-                </a:solidFill>
-                <a:ea typeface="Roboto" panose="02000000000000000000" pitchFamily="2" charset="0"/>
-              </a:rPr>
-              <a:t>Linkedin</a:t>
-            </a:r>
-            <a:r>
-              <a:rPr lang="en-US" spc="-38" dirty="0">
-                <a:solidFill>
-                  <a:schemeClr val="tx1">
-                    <a:lumMod val="85000"/>
-                    <a:lumOff val="15000"/>
-                  </a:schemeClr>
-                </a:solidFill>
-                <a:ea typeface="Roboto" panose="02000000000000000000" pitchFamily="2" charset="0"/>
-              </a:rPr>
-              <a:t> - </a:t>
-            </a:r>
-            <a:r>
-              <a:rPr lang="en-US" spc="-38" dirty="0">
-                <a:solidFill>
-                  <a:schemeClr val="tx1">
-                    <a:lumMod val="85000"/>
-                    <a:lumOff val="15000"/>
-                  </a:schemeClr>
-                </a:solidFill>
-                <a:ea typeface="Roboto" panose="02000000000000000000" pitchFamily="2" charset="0"/>
-                <a:hlinkClick r:id="rId5"/>
-              </a:rPr>
-              <a:t>http://www.linkedin.com/in/fabricioveronez</a:t>
-            </a:r>
-            <a:endParaRPr lang="en-US" spc="-38" dirty="0">
-              <a:solidFill>
-                <a:schemeClr val="tx1">
-                  <a:lumMod val="85000"/>
-                  <a:lumOff val="15000"/>
-                </a:schemeClr>
-              </a:solidFill>
-              <a:ea typeface="Roboto" panose="02000000000000000000" pitchFamily="2" charset="0"/>
-            </a:endParaRPr>
-          </a:p>
-          <a:p>
-            <a:pPr>
-              <a:lnSpc>
-                <a:spcPct val="85000"/>
-              </a:lnSpc>
-              <a:spcBef>
-                <a:spcPct val="0"/>
-              </a:spcBef>
-            </a:pPr>
-            <a:r>
-              <a:rPr lang="en-US" spc="-38" dirty="0">
-                <a:solidFill>
-                  <a:schemeClr val="tx1">
-                    <a:lumMod val="85000"/>
-                    <a:lumOff val="15000"/>
-                  </a:schemeClr>
-                </a:solidFill>
-                <a:ea typeface="Roboto" panose="02000000000000000000" pitchFamily="2" charset="0"/>
-              </a:rPr>
-              <a:t>Telegram - </a:t>
-            </a:r>
-            <a:r>
-              <a:rPr lang="en-US" spc="-38" dirty="0" err="1">
-                <a:solidFill>
-                  <a:schemeClr val="tx1">
-                    <a:lumMod val="85000"/>
-                    <a:lumOff val="15000"/>
-                  </a:schemeClr>
-                </a:solidFill>
-                <a:ea typeface="Roboto" panose="02000000000000000000" pitchFamily="2" charset="0"/>
-              </a:rPr>
-              <a:t>fabricioveronez</a:t>
-            </a:r>
-            <a:endParaRPr lang="en-US" spc="-38" dirty="0">
-              <a:solidFill>
-                <a:schemeClr val="tx1">
-                  <a:lumMod val="85000"/>
-                  <a:lumOff val="15000"/>
-                </a:schemeClr>
-              </a:solidFill>
-              <a:ea typeface="Roboto" panose="02000000000000000000" pitchFamily="2" charset="0"/>
-            </a:endParaRPr>
-          </a:p>
-          <a:p>
-            <a:endParaRPr lang="en-US" dirty="0"/>
-          </a:p>
-        </p:txBody>
-      </p:sp>
-      <p:pic>
-        <p:nvPicPr>
-          <p:cNvPr id="13" name="Imagem 12">
-            <a:extLst>
-              <a:ext uri="{FF2B5EF4-FFF2-40B4-BE49-F238E27FC236}">
-                <a16:creationId xmlns:a16="http://schemas.microsoft.com/office/drawing/2014/main" id="{2F9450F7-57C3-4B2A-84A1-BEC5AB05EFB2}"/>
-              </a:ext>
-            </a:extLst>
-          </p:cNvPr>
-          <p:cNvPicPr>
-            <a:picLocks noChangeAspect="1"/>
-          </p:cNvPicPr>
-          <p:nvPr/>
-        </p:nvPicPr>
-        <p:blipFill>
-          <a:blip r:embed="rId6"/>
-          <a:stretch>
-            <a:fillRect/>
-          </a:stretch>
-        </p:blipFill>
-        <p:spPr>
-          <a:xfrm>
-            <a:off x="457831" y="284018"/>
-            <a:ext cx="2127461" cy="2127461"/>
-          </a:xfrm>
-          <a:prstGeom prst="rect">
-            <a:avLst/>
-          </a:prstGeom>
-        </p:spPr>
-      </p:pic>
-      <p:pic>
-        <p:nvPicPr>
-          <p:cNvPr id="14" name="Imagem 13">
-            <a:extLst>
-              <a:ext uri="{FF2B5EF4-FFF2-40B4-BE49-F238E27FC236}">
-                <a16:creationId xmlns:a16="http://schemas.microsoft.com/office/drawing/2014/main" id="{2814084F-88C0-4E7A-B6DE-A817038DB86C}"/>
-              </a:ext>
-            </a:extLst>
-          </p:cNvPr>
-          <p:cNvPicPr>
-            <a:picLocks noChangeAspect="1"/>
-          </p:cNvPicPr>
-          <p:nvPr/>
-        </p:nvPicPr>
-        <p:blipFill>
-          <a:blip r:embed="rId7"/>
-          <a:stretch>
-            <a:fillRect/>
-          </a:stretch>
-        </p:blipFill>
-        <p:spPr>
-          <a:xfrm>
-            <a:off x="3385580" y="1191862"/>
-            <a:ext cx="3482360" cy="1957871"/>
-          </a:xfrm>
-          <a:prstGeom prst="rect">
-            <a:avLst/>
-          </a:prstGeom>
-        </p:spPr>
-      </p:pic>
-      <p:pic>
-        <p:nvPicPr>
-          <p:cNvPr id="8" name="Imagem 7">
-            <a:extLst>
-              <a:ext uri="{FF2B5EF4-FFF2-40B4-BE49-F238E27FC236}">
-                <a16:creationId xmlns:a16="http://schemas.microsoft.com/office/drawing/2014/main" id="{90008BBE-F72F-4FB7-9D54-B7768EDB93E0}"/>
-              </a:ext>
-            </a:extLst>
-          </p:cNvPr>
-          <p:cNvPicPr>
-            <a:picLocks noChangeAspect="1"/>
-          </p:cNvPicPr>
-          <p:nvPr/>
-        </p:nvPicPr>
-        <p:blipFill>
-          <a:blip r:embed="rId8"/>
-          <a:stretch>
-            <a:fillRect/>
-          </a:stretch>
-        </p:blipFill>
-        <p:spPr>
-          <a:xfrm>
-            <a:off x="3385580" y="2571750"/>
-            <a:ext cx="2533358" cy="631163"/>
-          </a:xfrm>
-          <a:prstGeom prst="rect">
-            <a:avLst/>
-          </a:prstGeom>
-        </p:spPr>
-      </p:pic>
-      <p:pic>
-        <p:nvPicPr>
-          <p:cNvPr id="11" name="Imagem 10">
-            <a:extLst>
-              <a:ext uri="{FF2B5EF4-FFF2-40B4-BE49-F238E27FC236}">
-                <a16:creationId xmlns:a16="http://schemas.microsoft.com/office/drawing/2014/main" id="{5A6EFF9A-658F-4A70-9383-7EF936F56B66}"/>
-              </a:ext>
-            </a:extLst>
-          </p:cNvPr>
-          <p:cNvPicPr>
-            <a:picLocks noChangeAspect="1"/>
-          </p:cNvPicPr>
-          <p:nvPr/>
-        </p:nvPicPr>
-        <p:blipFill>
-          <a:blip r:embed="rId9"/>
-          <a:stretch>
-            <a:fillRect/>
-          </a:stretch>
-        </p:blipFill>
-        <p:spPr>
-          <a:xfrm>
-            <a:off x="-24686" y="2892401"/>
-            <a:ext cx="3010122" cy="1599734"/>
-          </a:xfrm>
-          <a:prstGeom prst="rect">
-            <a:avLst/>
-          </a:prstGeom>
-        </p:spPr>
-      </p:pic>
-    </p:spTree>
-  </p:cSld>
-  <p:clrMapOvr>
-    <a:masterClrMapping/>
-  </p:clrMapOvr>
-</p:sld>
-</file>
-
-<file path=ppt/slides/slide20.xml><?xml version="1.0" encoding="utf-8"?>
+<file path=ppt/slides/slide18.xml><?xml version="1.0" encoding="utf-8"?>
 <p:sld xmlns:a="http://schemas.openxmlformats.org/drawingml/2006/main" xmlns:r="http://schemas.openxmlformats.org/officeDocument/2006/relationships" xmlns:p="http://schemas.openxmlformats.org/presentationml/2006/main">
   <p:cSld>
     <p:spTree>
@@ -12081,7 +11122,640 @@
 </p:sld>
 </file>
 
-<file path=ppt/slides/slide21.xml><?xml version="1.0" encoding="utf-8"?>
+<file path=ppt/slides/slide19.xml><?xml version="1.0" encoding="utf-8"?>
+<p:sld xmlns:a="http://schemas.openxmlformats.org/drawingml/2006/main" xmlns:r="http://schemas.openxmlformats.org/officeDocument/2006/relationships" xmlns:p="http://schemas.openxmlformats.org/presentationml/2006/main">
+  <p:cSld>
+    <p:spTree>
+      <p:nvGrpSpPr>
+        <p:cNvPr id="1" name="Shape 358"/>
+        <p:cNvGrpSpPr/>
+        <p:nvPr/>
+      </p:nvGrpSpPr>
+      <p:grpSpPr>
+        <a:xfrm>
+          <a:off x="0" y="0"/>
+          <a:ext cx="0" cy="0"/>
+          <a:chOff x="0" y="0"/>
+          <a:chExt cx="0" cy="0"/>
+        </a:xfrm>
+      </p:grpSpPr>
+      <p:pic>
+        <p:nvPicPr>
+          <p:cNvPr id="3" name="Imagem 2">
+            <a:extLst>
+              <a:ext uri="{FF2B5EF4-FFF2-40B4-BE49-F238E27FC236}">
+                <a16:creationId xmlns:a16="http://schemas.microsoft.com/office/drawing/2014/main" id="{0F252917-ECF4-442A-96AB-395EB7B14D10}"/>
+              </a:ext>
+            </a:extLst>
+          </p:cNvPr>
+          <p:cNvPicPr>
+            <a:picLocks noChangeAspect="1"/>
+          </p:cNvPicPr>
+          <p:nvPr/>
+        </p:nvPicPr>
+        <p:blipFill>
+          <a:blip r:embed="rId3"/>
+          <a:srcRect/>
+          <a:stretch/>
+        </p:blipFill>
+        <p:spPr>
+          <a:xfrm>
+            <a:off x="1095042" y="431150"/>
+            <a:ext cx="6953915" cy="4174408"/>
+          </a:xfrm>
+          <a:prstGeom prst="rect">
+            <a:avLst/>
+          </a:prstGeom>
+        </p:spPr>
+      </p:pic>
+    </p:spTree>
+    <p:extLst>
+      <p:ext uri="{BB962C8B-B14F-4D97-AF65-F5344CB8AC3E}">
+        <p14:creationId xmlns:p14="http://schemas.microsoft.com/office/powerpoint/2010/main" val="4292202780"/>
+      </p:ext>
+    </p:extLst>
+  </p:cSld>
+  <p:clrMapOvr>
+    <a:masterClrMapping/>
+  </p:clrMapOvr>
+</p:sld>
+</file>
+
+<file path=ppt/slides/slide2.xml><?xml version="1.0" encoding="utf-8"?>
+<p:sld xmlns:a="http://schemas.openxmlformats.org/drawingml/2006/main" xmlns:r="http://schemas.openxmlformats.org/officeDocument/2006/relationships" xmlns:p="http://schemas.openxmlformats.org/presentationml/2006/main">
+  <p:cSld>
+    <p:spTree>
+      <p:nvGrpSpPr>
+        <p:cNvPr id="1" name="Shape 350"/>
+        <p:cNvGrpSpPr/>
+        <p:nvPr/>
+      </p:nvGrpSpPr>
+      <p:grpSpPr>
+        <a:xfrm>
+          <a:off x="0" y="0"/>
+          <a:ext cx="0" cy="0"/>
+          <a:chOff x="0" y="0"/>
+          <a:chExt cx="0" cy="0"/>
+        </a:xfrm>
+      </p:grpSpPr>
+      <p:sp>
+        <p:nvSpPr>
+          <p:cNvPr id="9" name="Google Shape;352;p13">
+            <a:extLst>
+              <a:ext uri="{FF2B5EF4-FFF2-40B4-BE49-F238E27FC236}">
+                <a16:creationId xmlns:a16="http://schemas.microsoft.com/office/drawing/2014/main" id="{1018BA2E-FDE0-4044-AA13-4C495BF1C438}"/>
+              </a:ext>
+            </a:extLst>
+          </p:cNvPr>
+          <p:cNvSpPr txBox="1">
+            <a:spLocks noGrp="1"/>
+          </p:cNvSpPr>
+          <p:nvPr>
+            <p:ph type="body" sz="half" idx="2"/>
+          </p:nvPr>
+        </p:nvSpPr>
+        <p:spPr>
+          <a:xfrm>
+            <a:off x="3079739" y="284018"/>
+            <a:ext cx="5496362" cy="1502430"/>
+          </a:xfrm>
+          <a:prstGeom prst="rect">
+            <a:avLst/>
+          </a:prstGeom>
+        </p:spPr>
+        <p:txBody>
+          <a:bodyPr spcFirstLastPara="1" wrap="square" lIns="91425" tIns="91425" rIns="91425" bIns="91425" anchor="t" anchorCtr="0">
+            <a:noAutofit/>
+          </a:bodyPr>
+          <a:lstStyle/>
+          <a:p>
+            <a:pPr marL="0" indent="0">
+              <a:lnSpc>
+                <a:spcPct val="85000"/>
+              </a:lnSpc>
+              <a:spcBef>
+                <a:spcPct val="0"/>
+              </a:spcBef>
+              <a:spcAft>
+                <a:spcPts val="0"/>
+              </a:spcAft>
+            </a:pPr>
+            <a:r>
+              <a:rPr lang="en-US" sz="4800" b="1" spc="-38" dirty="0" err="1">
+                <a:solidFill>
+                  <a:schemeClr val="tx1">
+                    <a:lumMod val="85000"/>
+                    <a:lumOff val="15000"/>
+                  </a:schemeClr>
+                </a:solidFill>
+                <a:latin typeface="Roboto" panose="02000000000000000000" pitchFamily="2" charset="0"/>
+                <a:ea typeface="Roboto" panose="02000000000000000000" pitchFamily="2" charset="0"/>
+                <a:cs typeface="+mj-cs"/>
+              </a:rPr>
+              <a:t>Fabrício</a:t>
+            </a:r>
+            <a:r>
+              <a:rPr lang="en-US" sz="4800" b="1" spc="-38" dirty="0">
+                <a:solidFill>
+                  <a:schemeClr val="tx1">
+                    <a:lumMod val="85000"/>
+                    <a:lumOff val="15000"/>
+                  </a:schemeClr>
+                </a:solidFill>
+                <a:latin typeface="Roboto" panose="02000000000000000000" pitchFamily="2" charset="0"/>
+                <a:ea typeface="Roboto" panose="02000000000000000000" pitchFamily="2" charset="0"/>
+                <a:cs typeface="+mj-cs"/>
+              </a:rPr>
+              <a:t> Veronez</a:t>
+            </a:r>
+            <a:endParaRPr sz="4800" b="1" spc="-38" dirty="0">
+              <a:solidFill>
+                <a:schemeClr val="tx1">
+                  <a:lumMod val="85000"/>
+                  <a:lumOff val="15000"/>
+                </a:schemeClr>
+              </a:solidFill>
+              <a:latin typeface="Roboto" panose="02000000000000000000" pitchFamily="2" charset="0"/>
+              <a:ea typeface="Roboto" panose="02000000000000000000" pitchFamily="2" charset="0"/>
+              <a:cs typeface="+mj-cs"/>
+            </a:endParaRPr>
+          </a:p>
+          <a:p>
+            <a:pPr marL="0" indent="0">
+              <a:lnSpc>
+                <a:spcPct val="85000"/>
+              </a:lnSpc>
+              <a:spcBef>
+                <a:spcPct val="0"/>
+              </a:spcBef>
+              <a:spcAft>
+                <a:spcPts val="0"/>
+              </a:spcAft>
+            </a:pPr>
+            <a:r>
+              <a:rPr lang="en-US" sz="3200" spc="-38" dirty="0" err="1">
+                <a:solidFill>
+                  <a:schemeClr val="tx1">
+                    <a:lumMod val="85000"/>
+                    <a:lumOff val="15000"/>
+                  </a:schemeClr>
+                </a:solidFill>
+                <a:latin typeface="Roboto" panose="02000000000000000000" pitchFamily="2" charset="0"/>
+                <a:ea typeface="Roboto" panose="02000000000000000000" pitchFamily="2" charset="0"/>
+                <a:cs typeface="+mj-cs"/>
+              </a:rPr>
+              <a:t>Arquiteto</a:t>
+            </a:r>
+            <a:r>
+              <a:rPr lang="en-US" sz="3200" spc="-38" dirty="0">
+                <a:solidFill>
+                  <a:schemeClr val="tx1">
+                    <a:lumMod val="85000"/>
+                    <a:lumOff val="15000"/>
+                  </a:schemeClr>
+                </a:solidFill>
+                <a:latin typeface="Roboto" panose="02000000000000000000" pitchFamily="2" charset="0"/>
+                <a:ea typeface="Roboto" panose="02000000000000000000" pitchFamily="2" charset="0"/>
+                <a:cs typeface="+mj-cs"/>
+              </a:rPr>
+              <a:t> de </a:t>
+            </a:r>
+            <a:r>
+              <a:rPr lang="en-US" sz="3200" spc="-38" dirty="0" err="1">
+                <a:solidFill>
+                  <a:schemeClr val="tx1">
+                    <a:lumMod val="85000"/>
+                    <a:lumOff val="15000"/>
+                  </a:schemeClr>
+                </a:solidFill>
+                <a:latin typeface="Roboto" panose="02000000000000000000" pitchFamily="2" charset="0"/>
+                <a:ea typeface="Roboto" panose="02000000000000000000" pitchFamily="2" charset="0"/>
+                <a:cs typeface="+mj-cs"/>
+              </a:rPr>
+              <a:t>Aplicações</a:t>
+            </a:r>
+            <a:endParaRPr sz="3200" spc="-38" dirty="0">
+              <a:solidFill>
+                <a:schemeClr val="tx1">
+                  <a:lumMod val="85000"/>
+                  <a:lumOff val="15000"/>
+                </a:schemeClr>
+              </a:solidFill>
+              <a:latin typeface="Roboto" panose="02000000000000000000" pitchFamily="2" charset="0"/>
+              <a:ea typeface="Roboto" panose="02000000000000000000" pitchFamily="2" charset="0"/>
+              <a:cs typeface="+mj-cs"/>
+            </a:endParaRPr>
+          </a:p>
+        </p:txBody>
+      </p:sp>
+      <p:sp>
+        <p:nvSpPr>
+          <p:cNvPr id="12" name="CaixaDeTexto 11">
+            <a:extLst>
+              <a:ext uri="{FF2B5EF4-FFF2-40B4-BE49-F238E27FC236}">
+                <a16:creationId xmlns:a16="http://schemas.microsoft.com/office/drawing/2014/main" id="{2CFE1A40-C45B-403D-8565-3D82BCD84EDC}"/>
+              </a:ext>
+            </a:extLst>
+          </p:cNvPr>
+          <p:cNvSpPr txBox="1"/>
+          <p:nvPr/>
+        </p:nvSpPr>
+        <p:spPr>
+          <a:xfrm>
+            <a:off x="3079739" y="3384402"/>
+            <a:ext cx="6156750" cy="1546577"/>
+          </a:xfrm>
+          <a:prstGeom prst="rect">
+            <a:avLst/>
+          </a:prstGeom>
+          <a:noFill/>
+        </p:spPr>
+        <p:txBody>
+          <a:bodyPr wrap="none" rtlCol="0">
+            <a:spAutoFit/>
+          </a:bodyPr>
+          <a:lstStyle/>
+          <a:p>
+            <a:pPr>
+              <a:lnSpc>
+                <a:spcPct val="85000"/>
+              </a:lnSpc>
+              <a:spcBef>
+                <a:spcPct val="0"/>
+              </a:spcBef>
+            </a:pPr>
+            <a:r>
+              <a:rPr lang="en-US" spc="-38" dirty="0">
+                <a:solidFill>
+                  <a:schemeClr val="tx1">
+                    <a:lumMod val="85000"/>
+                    <a:lumOff val="15000"/>
+                  </a:schemeClr>
+                </a:solidFill>
+                <a:latin typeface="Roboto" panose="020B0604020202020204" charset="0"/>
+                <a:ea typeface="Roboto" panose="020B0604020202020204" charset="0"/>
+              </a:rPr>
+              <a:t>YouTube – Fabricio Veronez</a:t>
+            </a:r>
+          </a:p>
+          <a:p>
+            <a:pPr>
+              <a:lnSpc>
+                <a:spcPct val="85000"/>
+              </a:lnSpc>
+              <a:spcBef>
+                <a:spcPct val="0"/>
+              </a:spcBef>
+            </a:pPr>
+            <a:r>
+              <a:rPr lang="en-US" spc="-38" dirty="0">
+                <a:solidFill>
+                  <a:schemeClr val="tx1">
+                    <a:lumMod val="85000"/>
+                    <a:lumOff val="15000"/>
+                  </a:schemeClr>
+                </a:solidFill>
+                <a:latin typeface="Roboto" panose="020B0604020202020204" charset="0"/>
+                <a:ea typeface="Roboto" panose="020B0604020202020204" charset="0"/>
+              </a:rPr>
+              <a:t>Email - </a:t>
+            </a:r>
+            <a:r>
+              <a:rPr lang="en-US" spc="-38" dirty="0">
+                <a:solidFill>
+                  <a:schemeClr val="tx1">
+                    <a:lumMod val="85000"/>
+                    <a:lumOff val="15000"/>
+                  </a:schemeClr>
+                </a:solidFill>
+                <a:latin typeface="Roboto" panose="020B0604020202020204" charset="0"/>
+                <a:ea typeface="Roboto" panose="020B0604020202020204" charset="0"/>
+                <a:hlinkClick r:id="rId3"/>
+              </a:rPr>
+              <a:t>fabricioveronez@gmail.com</a:t>
+            </a:r>
+            <a:endParaRPr lang="en-US" spc="-38" dirty="0">
+              <a:solidFill>
+                <a:schemeClr val="tx1">
+                  <a:lumMod val="85000"/>
+                  <a:lumOff val="15000"/>
+                </a:schemeClr>
+              </a:solidFill>
+              <a:latin typeface="Roboto" panose="020B0604020202020204" charset="0"/>
+              <a:ea typeface="Roboto" panose="020B0604020202020204" charset="0"/>
+            </a:endParaRPr>
+          </a:p>
+          <a:p>
+            <a:pPr>
+              <a:lnSpc>
+                <a:spcPct val="85000"/>
+              </a:lnSpc>
+              <a:spcBef>
+                <a:spcPct val="0"/>
+              </a:spcBef>
+            </a:pPr>
+            <a:r>
+              <a:rPr lang="en-US" spc="-38" dirty="0">
+                <a:solidFill>
+                  <a:schemeClr val="tx1">
+                    <a:lumMod val="85000"/>
+                    <a:lumOff val="15000"/>
+                  </a:schemeClr>
+                </a:solidFill>
+                <a:latin typeface="Roboto" panose="020B0604020202020204" charset="0"/>
+                <a:ea typeface="Roboto" panose="020B0604020202020204" charset="0"/>
+              </a:rPr>
+              <a:t>Facebook - </a:t>
+            </a:r>
+            <a:r>
+              <a:rPr lang="pt-BR" dirty="0">
+                <a:latin typeface="Roboto" panose="020B0604020202020204" charset="0"/>
+                <a:ea typeface="Roboto" panose="020B0604020202020204" charset="0"/>
+                <a:hlinkClick r:id="rId4"/>
+              </a:rPr>
+              <a:t>http://www.facebook.com/fabricioveronezdev/</a:t>
+            </a:r>
+            <a:endParaRPr lang="en-US" spc="-38" dirty="0">
+              <a:solidFill>
+                <a:schemeClr val="tx1">
+                  <a:lumMod val="85000"/>
+                  <a:lumOff val="15000"/>
+                </a:schemeClr>
+              </a:solidFill>
+              <a:latin typeface="Roboto" panose="020B0604020202020204" charset="0"/>
+              <a:ea typeface="Roboto" panose="020B0604020202020204" charset="0"/>
+            </a:endParaRPr>
+          </a:p>
+          <a:p>
+            <a:pPr>
+              <a:lnSpc>
+                <a:spcPct val="85000"/>
+              </a:lnSpc>
+              <a:spcBef>
+                <a:spcPct val="0"/>
+              </a:spcBef>
+            </a:pPr>
+            <a:r>
+              <a:rPr lang="en-US" spc="-38" dirty="0" err="1">
+                <a:solidFill>
+                  <a:schemeClr val="tx1">
+                    <a:lumMod val="85000"/>
+                    <a:lumOff val="15000"/>
+                  </a:schemeClr>
+                </a:solidFill>
+                <a:latin typeface="Roboto" panose="020B0604020202020204" charset="0"/>
+                <a:ea typeface="Roboto" panose="020B0604020202020204" charset="0"/>
+              </a:rPr>
+              <a:t>Linkedin</a:t>
+            </a:r>
+            <a:r>
+              <a:rPr lang="en-US" spc="-38" dirty="0">
+                <a:solidFill>
+                  <a:schemeClr val="tx1">
+                    <a:lumMod val="85000"/>
+                    <a:lumOff val="15000"/>
+                  </a:schemeClr>
+                </a:solidFill>
+                <a:latin typeface="Roboto" panose="020B0604020202020204" charset="0"/>
+                <a:ea typeface="Roboto" panose="020B0604020202020204" charset="0"/>
+              </a:rPr>
+              <a:t> - </a:t>
+            </a:r>
+            <a:r>
+              <a:rPr lang="en-US" spc="-38" dirty="0">
+                <a:solidFill>
+                  <a:schemeClr val="tx1">
+                    <a:lumMod val="85000"/>
+                    <a:lumOff val="15000"/>
+                  </a:schemeClr>
+                </a:solidFill>
+                <a:latin typeface="Roboto" panose="020B0604020202020204" charset="0"/>
+                <a:ea typeface="Roboto" panose="020B0604020202020204" charset="0"/>
+                <a:hlinkClick r:id="rId5"/>
+              </a:rPr>
+              <a:t>http://www.linkedin.com/in/fabricioveronez</a:t>
+            </a:r>
+            <a:endParaRPr lang="en-US" spc="-38" dirty="0">
+              <a:solidFill>
+                <a:schemeClr val="tx1">
+                  <a:lumMod val="85000"/>
+                  <a:lumOff val="15000"/>
+                </a:schemeClr>
+              </a:solidFill>
+              <a:latin typeface="Roboto" panose="020B0604020202020204" charset="0"/>
+              <a:ea typeface="Roboto" panose="020B0604020202020204" charset="0"/>
+            </a:endParaRPr>
+          </a:p>
+          <a:p>
+            <a:pPr>
+              <a:lnSpc>
+                <a:spcPct val="85000"/>
+              </a:lnSpc>
+              <a:spcBef>
+                <a:spcPct val="0"/>
+              </a:spcBef>
+            </a:pPr>
+            <a:r>
+              <a:rPr lang="en-US" spc="-38" dirty="0">
+                <a:solidFill>
+                  <a:schemeClr val="tx1">
+                    <a:lumMod val="85000"/>
+                    <a:lumOff val="15000"/>
+                  </a:schemeClr>
+                </a:solidFill>
+                <a:latin typeface="Roboto" panose="020B0604020202020204" charset="0"/>
+                <a:ea typeface="Roboto" panose="020B0604020202020204" charset="0"/>
+              </a:rPr>
+              <a:t>Telegram - </a:t>
+            </a:r>
+            <a:r>
+              <a:rPr lang="en-US" spc="-38" dirty="0" err="1">
+                <a:solidFill>
+                  <a:schemeClr val="tx1">
+                    <a:lumMod val="85000"/>
+                    <a:lumOff val="15000"/>
+                  </a:schemeClr>
+                </a:solidFill>
+                <a:latin typeface="Roboto" panose="020B0604020202020204" charset="0"/>
+                <a:ea typeface="Roboto" panose="020B0604020202020204" charset="0"/>
+              </a:rPr>
+              <a:t>fabricioveronez</a:t>
+            </a:r>
+            <a:endParaRPr lang="en-US" spc="-38" dirty="0">
+              <a:solidFill>
+                <a:schemeClr val="tx1">
+                  <a:lumMod val="85000"/>
+                  <a:lumOff val="15000"/>
+                </a:schemeClr>
+              </a:solidFill>
+              <a:latin typeface="Roboto" panose="020B0604020202020204" charset="0"/>
+              <a:ea typeface="Roboto" panose="020B0604020202020204" charset="0"/>
+            </a:endParaRPr>
+          </a:p>
+          <a:p>
+            <a:endParaRPr lang="en-US" dirty="0"/>
+          </a:p>
+        </p:txBody>
+      </p:sp>
+      <p:pic>
+        <p:nvPicPr>
+          <p:cNvPr id="14" name="Imagem 13">
+            <a:extLst>
+              <a:ext uri="{FF2B5EF4-FFF2-40B4-BE49-F238E27FC236}">
+                <a16:creationId xmlns:a16="http://schemas.microsoft.com/office/drawing/2014/main" id="{2814084F-88C0-4E7A-B6DE-A817038DB86C}"/>
+              </a:ext>
+            </a:extLst>
+          </p:cNvPr>
+          <p:cNvPicPr>
+            <a:picLocks noChangeAspect="1"/>
+          </p:cNvPicPr>
+          <p:nvPr/>
+        </p:nvPicPr>
+        <p:blipFill>
+          <a:blip r:embed="rId6"/>
+          <a:stretch>
+            <a:fillRect/>
+          </a:stretch>
+        </p:blipFill>
+        <p:spPr>
+          <a:xfrm>
+            <a:off x="3154468" y="729637"/>
+            <a:ext cx="3482360" cy="1957871"/>
+          </a:xfrm>
+          <a:prstGeom prst="rect">
+            <a:avLst/>
+          </a:prstGeom>
+        </p:spPr>
+      </p:pic>
+      <p:pic>
+        <p:nvPicPr>
+          <p:cNvPr id="8" name="Imagem 7">
+            <a:extLst>
+              <a:ext uri="{FF2B5EF4-FFF2-40B4-BE49-F238E27FC236}">
+                <a16:creationId xmlns:a16="http://schemas.microsoft.com/office/drawing/2014/main" id="{90008BBE-F72F-4FB7-9D54-B7768EDB93E0}"/>
+              </a:ext>
+            </a:extLst>
+          </p:cNvPr>
+          <p:cNvPicPr>
+            <a:picLocks noChangeAspect="1"/>
+          </p:cNvPicPr>
+          <p:nvPr/>
+        </p:nvPicPr>
+        <p:blipFill>
+          <a:blip r:embed="rId7"/>
+          <a:stretch>
+            <a:fillRect/>
+          </a:stretch>
+        </p:blipFill>
+        <p:spPr>
+          <a:xfrm>
+            <a:off x="3154468" y="2056345"/>
+            <a:ext cx="2533358" cy="631163"/>
+          </a:xfrm>
+          <a:prstGeom prst="rect">
+            <a:avLst/>
+          </a:prstGeom>
+        </p:spPr>
+      </p:pic>
+      <p:pic>
+        <p:nvPicPr>
+          <p:cNvPr id="11" name="Imagem 10">
+            <a:extLst>
+              <a:ext uri="{FF2B5EF4-FFF2-40B4-BE49-F238E27FC236}">
+                <a16:creationId xmlns:a16="http://schemas.microsoft.com/office/drawing/2014/main" id="{5A6EFF9A-658F-4A70-9383-7EF936F56B66}"/>
+              </a:ext>
+            </a:extLst>
+          </p:cNvPr>
+          <p:cNvPicPr>
+            <a:picLocks noChangeAspect="1"/>
+          </p:cNvPicPr>
+          <p:nvPr/>
+        </p:nvPicPr>
+        <p:blipFill>
+          <a:blip r:embed="rId8"/>
+          <a:stretch>
+            <a:fillRect/>
+          </a:stretch>
+        </p:blipFill>
+        <p:spPr>
+          <a:xfrm>
+            <a:off x="0" y="2812015"/>
+            <a:ext cx="3010122" cy="1599734"/>
+          </a:xfrm>
+          <a:prstGeom prst="rect">
+            <a:avLst/>
+          </a:prstGeom>
+        </p:spPr>
+      </p:pic>
+      <p:pic>
+        <p:nvPicPr>
+          <p:cNvPr id="3" name="Imagem 2" descr="Uma imagem contendo placa&#10;&#10;Descrição gerada automaticamente">
+            <a:extLst>
+              <a:ext uri="{FF2B5EF4-FFF2-40B4-BE49-F238E27FC236}">
+                <a16:creationId xmlns:a16="http://schemas.microsoft.com/office/drawing/2014/main" id="{03E18957-9367-4F39-BBBA-5E45A8BE8710}"/>
+              </a:ext>
+            </a:extLst>
+          </p:cNvPr>
+          <p:cNvPicPr>
+            <a:picLocks noChangeAspect="1"/>
+          </p:cNvPicPr>
+          <p:nvPr/>
+        </p:nvPicPr>
+        <p:blipFill>
+          <a:blip r:embed="rId9"/>
+          <a:stretch>
+            <a:fillRect/>
+          </a:stretch>
+        </p:blipFill>
+        <p:spPr>
+          <a:xfrm>
+            <a:off x="3175279" y="2629629"/>
+            <a:ext cx="2512547" cy="812652"/>
+          </a:xfrm>
+          <a:prstGeom prst="rect">
+            <a:avLst/>
+          </a:prstGeom>
+        </p:spPr>
+      </p:pic>
+      <p:pic>
+        <p:nvPicPr>
+          <p:cNvPr id="5" name="Imagem 4" descr="Homem posando para foto&#10;&#10;Descrição gerada automaticamente">
+            <a:extLst>
+              <a:ext uri="{FF2B5EF4-FFF2-40B4-BE49-F238E27FC236}">
+                <a16:creationId xmlns:a16="http://schemas.microsoft.com/office/drawing/2014/main" id="{7727F71E-2619-48BE-8AA8-6A817D0AA604}"/>
+              </a:ext>
+            </a:extLst>
+          </p:cNvPr>
+          <p:cNvPicPr>
+            <a:picLocks noChangeAspect="1"/>
+          </p:cNvPicPr>
+          <p:nvPr/>
+        </p:nvPicPr>
+        <p:blipFill>
+          <a:blip r:embed="rId10"/>
+          <a:stretch>
+            <a:fillRect/>
+          </a:stretch>
+        </p:blipFill>
+        <p:spPr>
+          <a:xfrm>
+            <a:off x="472140" y="389522"/>
+            <a:ext cx="2062276" cy="2062276"/>
+          </a:xfrm>
+          <a:prstGeom prst="rect">
+            <a:avLst/>
+          </a:prstGeom>
+        </p:spPr>
+      </p:pic>
+    </p:spTree>
+  </p:cSld>
+  <p:clrMapOvr>
+    <a:masterClrMapping/>
+  </p:clrMapOvr>
+</p:sld>
+</file>
+
+<file path=ppt/slides/slide20.xml><?xml version="1.0" encoding="utf-8"?>
 <p:sld xmlns:a="http://schemas.openxmlformats.org/drawingml/2006/main" xmlns:r="http://schemas.openxmlformats.org/officeDocument/2006/relationships" xmlns:p="http://schemas.openxmlformats.org/presentationml/2006/main">
   <p:cSld>
     <p:spTree>
@@ -13068,6 +12742,65 @@
 </p:sld>
 </file>
 
+<file path=ppt/slides/slide21.xml><?xml version="1.0" encoding="utf-8"?>
+<p:sld xmlns:a="http://schemas.openxmlformats.org/drawingml/2006/main" xmlns:r="http://schemas.openxmlformats.org/officeDocument/2006/relationships" xmlns:p="http://schemas.openxmlformats.org/presentationml/2006/main">
+  <p:cSld>
+    <p:spTree>
+      <p:nvGrpSpPr>
+        <p:cNvPr id="1" name="Shape 358"/>
+        <p:cNvGrpSpPr/>
+        <p:nvPr/>
+      </p:nvGrpSpPr>
+      <p:grpSpPr>
+        <a:xfrm>
+          <a:off x="0" y="0"/>
+          <a:ext cx="0" cy="0"/>
+          <a:chOff x="0" y="0"/>
+          <a:chExt cx="0" cy="0"/>
+        </a:xfrm>
+      </p:grpSpPr>
+      <p:pic>
+        <p:nvPicPr>
+          <p:cNvPr id="3" name="Imagem 2">
+            <a:extLst>
+              <a:ext uri="{FF2B5EF4-FFF2-40B4-BE49-F238E27FC236}">
+                <a16:creationId xmlns:a16="http://schemas.microsoft.com/office/drawing/2014/main" id="{0F252917-ECF4-442A-96AB-395EB7B14D10}"/>
+              </a:ext>
+            </a:extLst>
+          </p:cNvPr>
+          <p:cNvPicPr>
+            <a:picLocks noChangeAspect="1"/>
+          </p:cNvPicPr>
+          <p:nvPr/>
+        </p:nvPicPr>
+        <p:blipFill>
+          <a:blip r:embed="rId3"/>
+          <a:srcRect/>
+          <a:stretch/>
+        </p:blipFill>
+        <p:spPr>
+          <a:xfrm>
+            <a:off x="1095042" y="431150"/>
+            <a:ext cx="6953915" cy="4174408"/>
+          </a:xfrm>
+          <a:prstGeom prst="rect">
+            <a:avLst/>
+          </a:prstGeom>
+        </p:spPr>
+      </p:pic>
+    </p:spTree>
+    <p:extLst>
+      <p:ext uri="{BB962C8B-B14F-4D97-AF65-F5344CB8AC3E}">
+        <p14:creationId xmlns:p14="http://schemas.microsoft.com/office/powerpoint/2010/main" val="2467578592"/>
+      </p:ext>
+    </p:extLst>
+  </p:cSld>
+  <p:clrMapOvr>
+    <a:masterClrMapping/>
+  </p:clrMapOvr>
+</p:sld>
+</file>
+
 <file path=ppt/slides/slide22.xml><?xml version="1.0" encoding="utf-8"?>
 <p:sld xmlns:a="http://schemas.openxmlformats.org/drawingml/2006/main" xmlns:r="http://schemas.openxmlformats.org/officeDocument/2006/relationships" xmlns:p="http://schemas.openxmlformats.org/presentationml/2006/main">
   <p:cSld>
@@ -14130,6 +13863,8 @@
                 <a:solidFill>
                   <a:schemeClr val="tx1"/>
                 </a:solidFill>
+                <a:latin typeface="Roboto" panose="020B0604020202020204" charset="0"/>
+                <a:ea typeface="Roboto" panose="020B0604020202020204" charset="0"/>
               </a:rPr>
               <a:t>Métricas</a:t>
             </a:r>
@@ -14137,6 +13872,8 @@
               <a:solidFill>
                 <a:schemeClr val="tx1"/>
               </a:solidFill>
+              <a:latin typeface="Roboto" panose="020B0604020202020204" charset="0"/>
+              <a:ea typeface="Roboto" panose="020B0604020202020204" charset="0"/>
             </a:endParaRPr>
           </a:p>
           <a:p>
@@ -14149,6 +13886,8 @@
                 <a:solidFill>
                   <a:schemeClr val="tx1"/>
                 </a:solidFill>
+                <a:latin typeface="Roboto" panose="020B0604020202020204" charset="0"/>
+                <a:ea typeface="Roboto" panose="020B0604020202020204" charset="0"/>
               </a:rPr>
               <a:t>Dados </a:t>
             </a:r>
@@ -14157,6 +13896,8 @@
                 <a:solidFill>
                   <a:schemeClr val="tx1"/>
                 </a:solidFill>
+                <a:latin typeface="Roboto" panose="020B0604020202020204" charset="0"/>
+                <a:ea typeface="Roboto" panose="020B0604020202020204" charset="0"/>
               </a:rPr>
               <a:t>numéricos</a:t>
             </a:r>
@@ -14164,6 +13905,8 @@
               <a:solidFill>
                 <a:schemeClr val="tx1"/>
               </a:solidFill>
+              <a:latin typeface="Roboto" panose="020B0604020202020204" charset="0"/>
+              <a:ea typeface="Roboto" panose="020B0604020202020204" charset="0"/>
             </a:endParaRPr>
           </a:p>
           <a:p>
@@ -14176,6 +13919,8 @@
                 <a:solidFill>
                   <a:schemeClr val="tx1"/>
                 </a:solidFill>
+                <a:latin typeface="Roboto" panose="020B0604020202020204" charset="0"/>
+                <a:ea typeface="Roboto" panose="020B0604020202020204" charset="0"/>
               </a:rPr>
               <a:t>Gráficos</a:t>
             </a:r>
@@ -14183,6 +13928,8 @@
               <a:solidFill>
                 <a:schemeClr val="tx1"/>
               </a:solidFill>
+              <a:latin typeface="Roboto" panose="020B0604020202020204" charset="0"/>
+              <a:ea typeface="Roboto" panose="020B0604020202020204" charset="0"/>
             </a:endParaRPr>
           </a:p>
           <a:p>
@@ -14195,6 +13942,8 @@
                 <a:solidFill>
                   <a:schemeClr val="tx1"/>
                 </a:solidFill>
+                <a:latin typeface="Roboto" panose="020B0604020202020204" charset="0"/>
+                <a:ea typeface="Roboto" panose="020B0604020202020204" charset="0"/>
               </a:rPr>
               <a:t>Agregações</a:t>
             </a:r>
@@ -14202,6 +13951,8 @@
               <a:solidFill>
                 <a:schemeClr val="tx1"/>
               </a:solidFill>
+              <a:latin typeface="Roboto" panose="020B0604020202020204" charset="0"/>
+              <a:ea typeface="Roboto" panose="020B0604020202020204" charset="0"/>
             </a:endParaRPr>
           </a:p>
           <a:p>
@@ -14214,6 +13965,8 @@
                 <a:solidFill>
                   <a:schemeClr val="tx1"/>
                 </a:solidFill>
+                <a:latin typeface="Roboto" panose="020B0604020202020204" charset="0"/>
+                <a:ea typeface="Roboto" panose="020B0604020202020204" charset="0"/>
               </a:rPr>
               <a:t>Performance</a:t>
             </a:r>
@@ -14519,6 +14272,8 @@
                 <a:solidFill>
                   <a:schemeClr val="tx1"/>
                 </a:solidFill>
+                <a:latin typeface="Roboto" panose="020B0604020202020204" charset="0"/>
+                <a:ea typeface="Roboto" panose="020B0604020202020204" charset="0"/>
               </a:rPr>
               <a:t>Logs</a:t>
             </a:r>
@@ -14533,6 +14288,8 @@
                 <a:solidFill>
                   <a:schemeClr val="tx1"/>
                 </a:solidFill>
+                <a:latin typeface="Roboto" panose="020B0604020202020204" charset="0"/>
+                <a:ea typeface="Roboto" panose="020B0604020202020204" charset="0"/>
               </a:rPr>
               <a:t>Dados </a:t>
             </a:r>
@@ -14541,6 +14298,8 @@
                 <a:solidFill>
                   <a:schemeClr val="tx1"/>
                 </a:solidFill>
+                <a:latin typeface="Roboto" panose="020B0604020202020204" charset="0"/>
+                <a:ea typeface="Roboto" panose="020B0604020202020204" charset="0"/>
               </a:rPr>
               <a:t>textuais</a:t>
             </a:r>
@@ -14548,6 +14307,8 @@
               <a:solidFill>
                 <a:schemeClr val="tx1"/>
               </a:solidFill>
+              <a:latin typeface="Roboto" panose="020B0604020202020204" charset="0"/>
+              <a:ea typeface="Roboto" panose="020B0604020202020204" charset="0"/>
             </a:endParaRPr>
           </a:p>
           <a:p>
@@ -14560,6 +14321,8 @@
                 <a:solidFill>
                   <a:schemeClr val="tx1"/>
                 </a:solidFill>
+                <a:latin typeface="Roboto" panose="020B0604020202020204" charset="0"/>
+                <a:ea typeface="Roboto" panose="020B0604020202020204" charset="0"/>
               </a:rPr>
               <a:t>Mensagens</a:t>
             </a:r>
@@ -14568,6 +14331,8 @@
                 <a:solidFill>
                   <a:schemeClr val="tx1"/>
                 </a:solidFill>
+                <a:latin typeface="Roboto" panose="020B0604020202020204" charset="0"/>
+                <a:ea typeface="Roboto" panose="020B0604020202020204" charset="0"/>
               </a:rPr>
               <a:t> de </a:t>
             </a:r>
@@ -14576,6 +14341,8 @@
                 <a:solidFill>
                   <a:schemeClr val="tx1"/>
                 </a:solidFill>
+                <a:latin typeface="Roboto" panose="020B0604020202020204" charset="0"/>
+                <a:ea typeface="Roboto" panose="020B0604020202020204" charset="0"/>
               </a:rPr>
               <a:t>Erro</a:t>
             </a:r>
@@ -14583,6 +14350,8 @@
               <a:solidFill>
                 <a:schemeClr val="tx1"/>
               </a:solidFill>
+              <a:latin typeface="Roboto" panose="020B0604020202020204" charset="0"/>
+              <a:ea typeface="Roboto" panose="020B0604020202020204" charset="0"/>
             </a:endParaRPr>
           </a:p>
           <a:p>
@@ -14595,6 +14364,8 @@
                 <a:solidFill>
                   <a:schemeClr val="tx1"/>
                 </a:solidFill>
+                <a:latin typeface="Roboto" panose="020B0604020202020204" charset="0"/>
+                <a:ea typeface="Roboto" panose="020B0604020202020204" charset="0"/>
               </a:rPr>
               <a:t>Informação</a:t>
             </a:r>
@@ -14602,6 +14373,8 @@
               <a:solidFill>
                 <a:schemeClr val="tx1"/>
               </a:solidFill>
+              <a:latin typeface="Roboto" panose="020B0604020202020204" charset="0"/>
+              <a:ea typeface="Roboto" panose="020B0604020202020204" charset="0"/>
             </a:endParaRPr>
           </a:p>
           <a:p>
@@ -14614,6 +14387,8 @@
                 <a:solidFill>
                   <a:schemeClr val="tx1"/>
                 </a:solidFill>
+                <a:latin typeface="Roboto" panose="020B0604020202020204" charset="0"/>
+                <a:ea typeface="Roboto" panose="020B0604020202020204" charset="0"/>
               </a:rPr>
               <a:t>Buscáveis</a:t>
             </a:r>
@@ -14622,6 +14397,8 @@
                 <a:solidFill>
                   <a:schemeClr val="tx1"/>
                 </a:solidFill>
+                <a:latin typeface="Roboto" panose="020B0604020202020204" charset="0"/>
+                <a:ea typeface="Roboto" panose="020B0604020202020204" charset="0"/>
               </a:rPr>
               <a:t> </a:t>
             </a:r>
@@ -14952,6 +14729,9 @@
             </a:pPr>
             <a:r>
               <a:rPr lang="pt-BR" sz="2000" dirty="0">
+                <a:solidFill>
+                  <a:schemeClr val="tx1"/>
+                </a:solidFill>
                 <a:latin typeface="Roboto" panose="02000000000000000000" pitchFamily="2" charset="0"/>
                 <a:ea typeface="Roboto" panose="02000000000000000000" pitchFamily="2" charset="0"/>
               </a:rPr>
@@ -14959,12 +14739,18 @@
             </a:r>
             <a:r>
               <a:rPr lang="pt-BR" sz="2000" dirty="0" err="1">
+                <a:solidFill>
+                  <a:schemeClr val="tx1"/>
+                </a:solidFill>
                 <a:latin typeface="Roboto" panose="02000000000000000000" pitchFamily="2" charset="0"/>
                 <a:ea typeface="Roboto" panose="02000000000000000000" pitchFamily="2" charset="0"/>
               </a:rPr>
               <a:t>SoundCloud</a:t>
             </a:r>
             <a:endParaRPr lang="pt-BR" sz="2000" dirty="0">
+              <a:solidFill>
+                <a:schemeClr val="tx1"/>
+              </a:solidFill>
               <a:latin typeface="Roboto" panose="02000000000000000000" pitchFamily="2" charset="0"/>
               <a:ea typeface="Roboto" panose="02000000000000000000" pitchFamily="2" charset="0"/>
             </a:endParaRPr>
@@ -14983,12 +14769,18 @@
             </a:pPr>
             <a:r>
               <a:rPr lang="pt-BR" sz="2000" dirty="0" err="1">
+                <a:solidFill>
+                  <a:schemeClr val="tx1"/>
+                </a:solidFill>
                 <a:latin typeface="Roboto" panose="02000000000000000000" pitchFamily="2" charset="0"/>
                 <a:ea typeface="Roboto" panose="02000000000000000000" pitchFamily="2" charset="0"/>
               </a:rPr>
               <a:t>OpenSource</a:t>
             </a:r>
             <a:endParaRPr lang="pt-BR" sz="2000" dirty="0">
+              <a:solidFill>
+                <a:schemeClr val="tx1"/>
+              </a:solidFill>
               <a:latin typeface="Roboto" panose="02000000000000000000" pitchFamily="2" charset="0"/>
               <a:ea typeface="Roboto" panose="02000000000000000000" pitchFamily="2" charset="0"/>
             </a:endParaRPr>
@@ -15007,6 +14799,9 @@
             </a:pPr>
             <a:r>
               <a:rPr lang="pt-BR" sz="2000" dirty="0">
+                <a:solidFill>
+                  <a:schemeClr val="tx1"/>
+                </a:solidFill>
                 <a:latin typeface="Roboto" panose="02000000000000000000" pitchFamily="2" charset="0"/>
                 <a:ea typeface="Roboto" panose="02000000000000000000" pitchFamily="2" charset="0"/>
               </a:rPr>
@@ -15027,6 +14822,9 @@
             </a:pPr>
             <a:r>
               <a:rPr lang="pt-BR" sz="2000" dirty="0">
+                <a:solidFill>
+                  <a:schemeClr val="tx1"/>
+                </a:solidFill>
                 <a:latin typeface="Roboto" panose="02000000000000000000" pitchFamily="2" charset="0"/>
                 <a:ea typeface="Roboto" panose="02000000000000000000" pitchFamily="2" charset="0"/>
               </a:rPr>
@@ -15047,6 +14845,9 @@
             </a:pPr>
             <a:r>
               <a:rPr lang="pt-BR" sz="2000" dirty="0">
+                <a:solidFill>
+                  <a:schemeClr val="tx1"/>
+                </a:solidFill>
                 <a:latin typeface="Roboto" panose="02000000000000000000" pitchFamily="2" charset="0"/>
                 <a:ea typeface="Roboto" panose="02000000000000000000" pitchFamily="2" charset="0"/>
               </a:rPr>
@@ -15067,6 +14868,9 @@
             </a:pPr>
             <a:r>
               <a:rPr lang="pt-BR" sz="2000" dirty="0">
+                <a:solidFill>
+                  <a:schemeClr val="tx1"/>
+                </a:solidFill>
                 <a:latin typeface="Roboto" panose="02000000000000000000" pitchFamily="2" charset="0"/>
                 <a:ea typeface="Roboto" panose="02000000000000000000" pitchFamily="2" charset="0"/>
               </a:rPr>
@@ -15196,10 +15000,10 @@
       </p:grpSpPr>
       <p:pic>
         <p:nvPicPr>
-          <p:cNvPr id="3" name="Imagem 2">
+          <p:cNvPr id="6" name="Imagem 5">
             <a:extLst>
               <a:ext uri="{FF2B5EF4-FFF2-40B4-BE49-F238E27FC236}">
-                <a16:creationId xmlns:a16="http://schemas.microsoft.com/office/drawing/2014/main" id="{0F252917-ECF4-442A-96AB-395EB7B14D10}"/>
+                <a16:creationId xmlns:a16="http://schemas.microsoft.com/office/drawing/2014/main" id="{F8BD068C-A504-449C-82DF-58DB846F820B}"/>
               </a:ext>
             </a:extLst>
           </p:cNvPr>
@@ -15210,29 +15014,340 @@
         </p:nvPicPr>
         <p:blipFill>
           <a:blip r:embed="rId3"/>
-          <a:srcRect/>
-          <a:stretch/>
+          <a:stretch>
+            <a:fillRect/>
+          </a:stretch>
         </p:blipFill>
         <p:spPr>
           <a:xfrm>
-            <a:off x="1095042" y="431150"/>
-            <a:ext cx="6953915" cy="4174408"/>
+            <a:off x="2140764" y="1878106"/>
+            <a:ext cx="1481417" cy="1481417"/>
           </a:xfrm>
           <a:prstGeom prst="rect">
             <a:avLst/>
           </a:prstGeom>
         </p:spPr>
       </p:pic>
+      <p:pic>
+        <p:nvPicPr>
+          <p:cNvPr id="11" name="Imagem 10">
+            <a:extLst>
+              <a:ext uri="{FF2B5EF4-FFF2-40B4-BE49-F238E27FC236}">
+                <a16:creationId xmlns:a16="http://schemas.microsoft.com/office/drawing/2014/main" id="{D77014C1-FEF8-40EF-B2C9-452CE2CD4033}"/>
+              </a:ext>
+            </a:extLst>
+          </p:cNvPr>
+          <p:cNvPicPr>
+            <a:picLocks noChangeAspect="1"/>
+          </p:cNvPicPr>
+          <p:nvPr/>
+        </p:nvPicPr>
+        <p:blipFill>
+          <a:blip r:embed="rId4"/>
+          <a:stretch>
+            <a:fillRect/>
+          </a:stretch>
+        </p:blipFill>
+        <p:spPr>
+          <a:xfrm>
+            <a:off x="5677232" y="1912844"/>
+            <a:ext cx="1424350" cy="1411940"/>
+          </a:xfrm>
+          <a:prstGeom prst="rect">
+            <a:avLst/>
+          </a:prstGeom>
+        </p:spPr>
+      </p:pic>
+      <p:sp>
+        <p:nvSpPr>
+          <p:cNvPr id="12" name="CaixaDeTexto 11">
+            <a:extLst>
+              <a:ext uri="{FF2B5EF4-FFF2-40B4-BE49-F238E27FC236}">
+                <a16:creationId xmlns:a16="http://schemas.microsoft.com/office/drawing/2014/main" id="{F5905E5D-35C0-46CA-A27A-B82B04576DBF}"/>
+              </a:ext>
+            </a:extLst>
+          </p:cNvPr>
+          <p:cNvSpPr txBox="1"/>
+          <p:nvPr/>
+        </p:nvSpPr>
+        <p:spPr>
+          <a:xfrm>
+            <a:off x="2881473" y="645459"/>
+            <a:ext cx="3381054" cy="584775"/>
+          </a:xfrm>
+          <a:prstGeom prst="rect">
+            <a:avLst/>
+          </a:prstGeom>
+          <a:noFill/>
+        </p:spPr>
+        <p:txBody>
+          <a:bodyPr wrap="none" rtlCol="0">
+            <a:spAutoFit/>
+          </a:bodyPr>
+          <a:lstStyle/>
+          <a:p>
+            <a:r>
+              <a:rPr lang="en-US" sz="3200" b="1" dirty="0">
+                <a:latin typeface="Roboto" panose="02000000000000000000" pitchFamily="2" charset="0"/>
+                <a:ea typeface="Roboto" panose="02000000000000000000" pitchFamily="2" charset="0"/>
+              </a:rPr>
+              <a:t>Coleta dos dados</a:t>
+            </a:r>
+            <a:endParaRPr lang="pt-BR" sz="3200" b="1" dirty="0">
+              <a:latin typeface="Roboto" panose="02000000000000000000" pitchFamily="2" charset="0"/>
+              <a:ea typeface="Roboto" panose="02000000000000000000" pitchFamily="2" charset="0"/>
+            </a:endParaRPr>
+          </a:p>
+        </p:txBody>
+      </p:sp>
+      <p:pic>
+        <p:nvPicPr>
+          <p:cNvPr id="14" name="Imagem 13">
+            <a:extLst>
+              <a:ext uri="{FF2B5EF4-FFF2-40B4-BE49-F238E27FC236}">
+                <a16:creationId xmlns:a16="http://schemas.microsoft.com/office/drawing/2014/main" id="{4BFDA0D3-1A57-4E17-8B8B-215BC6D9E7F4}"/>
+              </a:ext>
+            </a:extLst>
+          </p:cNvPr>
+          <p:cNvPicPr>
+            <a:picLocks noChangeAspect="1"/>
+          </p:cNvPicPr>
+          <p:nvPr/>
+        </p:nvPicPr>
+        <p:blipFill>
+          <a:blip r:embed="rId5"/>
+          <a:stretch>
+            <a:fillRect/>
+          </a:stretch>
+        </p:blipFill>
+        <p:spPr>
+          <a:xfrm>
+            <a:off x="3168343" y="2257424"/>
+            <a:ext cx="722780" cy="722780"/>
+          </a:xfrm>
+          <a:prstGeom prst="rect">
+            <a:avLst/>
+          </a:prstGeom>
+        </p:spPr>
+      </p:pic>
+      <p:sp>
+        <p:nvSpPr>
+          <p:cNvPr id="15" name="Seta: para a Direita 14">
+            <a:extLst>
+              <a:ext uri="{FF2B5EF4-FFF2-40B4-BE49-F238E27FC236}">
+                <a16:creationId xmlns:a16="http://schemas.microsoft.com/office/drawing/2014/main" id="{A3CF5F5D-337E-418B-9E33-1AFDA75E1833}"/>
+              </a:ext>
+            </a:extLst>
+          </p:cNvPr>
+          <p:cNvSpPr/>
+          <p:nvPr/>
+        </p:nvSpPr>
+        <p:spPr>
+          <a:xfrm rot="10800000">
+            <a:off x="3897846" y="2660275"/>
+            <a:ext cx="1580029" cy="123265"/>
+          </a:xfrm>
+          <a:prstGeom prst="rightArrow">
+            <a:avLst/>
+          </a:prstGeom>
+        </p:spPr>
+        <p:style>
+          <a:lnRef idx="2">
+            <a:schemeClr val="accent1">
+              <a:shade val="50000"/>
+            </a:schemeClr>
+          </a:lnRef>
+          <a:fillRef idx="1">
+            <a:schemeClr val="accent1"/>
+          </a:fillRef>
+          <a:effectRef idx="0">
+            <a:schemeClr val="accent1"/>
+          </a:effectRef>
+          <a:fontRef idx="minor">
+            <a:schemeClr val="lt1"/>
+          </a:fontRef>
+        </p:style>
+        <p:txBody>
+          <a:bodyPr rtlCol="0" anchor="ctr"/>
+          <a:lstStyle/>
+          <a:p>
+            <a:pPr algn="ctr"/>
+            <a:endParaRPr lang="pt-BR"/>
+          </a:p>
+        </p:txBody>
+      </p:sp>
     </p:spTree>
     <p:extLst>
       <p:ext uri="{BB962C8B-B14F-4D97-AF65-F5344CB8AC3E}">
-        <p14:creationId xmlns:p14="http://schemas.microsoft.com/office/powerpoint/2010/main" val="201540624"/>
+        <p14:creationId xmlns:p14="http://schemas.microsoft.com/office/powerpoint/2010/main" val="2267687944"/>
       </p:ext>
     </p:extLst>
   </p:cSld>
   <p:clrMapOvr>
     <a:masterClrMapping/>
   </p:clrMapOvr>
+  <p:timing>
+    <p:tnLst>
+      <p:par>
+        <p:cTn id="1" dur="indefinite" restart="never" nodeType="tmRoot">
+          <p:childTnLst>
+            <p:seq concurrent="1" nextAc="seek">
+              <p:cTn id="2" dur="indefinite" nodeType="mainSeq">
+                <p:childTnLst>
+                  <p:par>
+                    <p:cTn id="3" fill="hold">
+                      <p:stCondLst>
+                        <p:cond delay="indefinite"/>
+                      </p:stCondLst>
+                      <p:childTnLst>
+                        <p:par>
+                          <p:cTn id="4" fill="hold">
+                            <p:stCondLst>
+                              <p:cond delay="0"/>
+                            </p:stCondLst>
+                            <p:childTnLst>
+                              <p:par>
+                                <p:cTn id="5" presetID="1" presetClass="entr" presetSubtype="0" fill="hold" grpId="0" nodeType="clickEffect">
+                                  <p:stCondLst>
+                                    <p:cond delay="0"/>
+                                  </p:stCondLst>
+                                  <p:childTnLst>
+                                    <p:set>
+                                      <p:cBhvr>
+                                        <p:cTn id="6" dur="1" fill="hold">
+                                          <p:stCondLst>
+                                            <p:cond delay="0"/>
+                                          </p:stCondLst>
+                                        </p:cTn>
+                                        <p:tgtEl>
+                                          <p:spTgt spid="15"/>
+                                        </p:tgtEl>
+                                        <p:attrNameLst>
+                                          <p:attrName>style.visibility</p:attrName>
+                                        </p:attrNameLst>
+                                      </p:cBhvr>
+                                      <p:to>
+                                        <p:strVal val="visible"/>
+                                      </p:to>
+                                    </p:set>
+                                  </p:childTnLst>
+                                </p:cTn>
+                              </p:par>
+                            </p:childTnLst>
+                          </p:cTn>
+                        </p:par>
+                      </p:childTnLst>
+                    </p:cTn>
+                  </p:par>
+                  <p:par>
+                    <p:cTn id="7" fill="hold">
+                      <p:stCondLst>
+                        <p:cond delay="indefinite"/>
+                      </p:stCondLst>
+                      <p:childTnLst>
+                        <p:par>
+                          <p:cTn id="8" fill="hold">
+                            <p:stCondLst>
+                              <p:cond delay="0"/>
+                            </p:stCondLst>
+                            <p:childTnLst>
+                              <p:par>
+                                <p:cTn id="9" presetID="1" presetClass="entr" presetSubtype="0" fill="hold" nodeType="clickEffect">
+                                  <p:stCondLst>
+                                    <p:cond delay="0"/>
+                                  </p:stCondLst>
+                                  <p:childTnLst>
+                                    <p:set>
+                                      <p:cBhvr>
+                                        <p:cTn id="10" dur="1" fill="hold">
+                                          <p:stCondLst>
+                                            <p:cond delay="0"/>
+                                          </p:stCondLst>
+                                        </p:cTn>
+                                        <p:tgtEl>
+                                          <p:spTgt spid="14"/>
+                                        </p:tgtEl>
+                                        <p:attrNameLst>
+                                          <p:attrName>style.visibility</p:attrName>
+                                        </p:attrNameLst>
+                                      </p:cBhvr>
+                                      <p:to>
+                                        <p:strVal val="visible"/>
+                                      </p:to>
+                                    </p:set>
+                                  </p:childTnLst>
+                                </p:cTn>
+                              </p:par>
+                            </p:childTnLst>
+                          </p:cTn>
+                        </p:par>
+                      </p:childTnLst>
+                    </p:cTn>
+                  </p:par>
+                  <p:par>
+                    <p:cTn id="11" fill="hold">
+                      <p:stCondLst>
+                        <p:cond delay="indefinite"/>
+                      </p:stCondLst>
+                      <p:childTnLst>
+                        <p:par>
+                          <p:cTn id="12" fill="hold">
+                            <p:stCondLst>
+                              <p:cond delay="0"/>
+                            </p:stCondLst>
+                            <p:childTnLst>
+                              <p:par>
+                                <p:cTn id="13" presetID="63" presetClass="path" presetSubtype="0" accel="50000" decel="50000" fill="hold" nodeType="clickEffect">
+                                  <p:stCondLst>
+                                    <p:cond delay="0"/>
+                                  </p:stCondLst>
+                                  <p:childTnLst>
+                                    <p:animMotion origin="layout" path="M 0 0 L 0.25 0 E" pathEditMode="relative" ptsTypes="">
+                                      <p:cBhvr>
+                                        <p:cTn id="14" dur="2000" fill="hold"/>
+                                        <p:tgtEl>
+                                          <p:spTgt spid="14"/>
+                                        </p:tgtEl>
+                                        <p:attrNameLst>
+                                          <p:attrName>ppt_x</p:attrName>
+                                          <p:attrName>ppt_y</p:attrName>
+                                        </p:attrNameLst>
+                                      </p:cBhvr>
+                                    </p:animMotion>
+                                  </p:childTnLst>
+                                </p:cTn>
+                              </p:par>
+                            </p:childTnLst>
+                          </p:cTn>
+                        </p:par>
+                      </p:childTnLst>
+                    </p:cTn>
+                  </p:par>
+                </p:childTnLst>
+              </p:cTn>
+              <p:prevCondLst>
+                <p:cond evt="onPrev" delay="0">
+                  <p:tgtEl>
+                    <p:sldTgt/>
+                  </p:tgtEl>
+                </p:cond>
+              </p:prevCondLst>
+              <p:nextCondLst>
+                <p:cond evt="onNext" delay="0">
+                  <p:tgtEl>
+                    <p:sldTgt/>
+                  </p:tgtEl>
+                </p:cond>
+              </p:nextCondLst>
+            </p:seq>
+          </p:childTnLst>
+        </p:cTn>
+      </p:par>
+    </p:tnLst>
+    <p:bldLst>
+      <p:bldP spid="15" grpId="0" animBg="1"/>
+    </p:bldLst>
+  </p:timing>
 </p:sld>
 </file>
 
@@ -15255,10 +15370,10 @@
       </p:grpSpPr>
       <p:pic>
         <p:nvPicPr>
-          <p:cNvPr id="3" name="Imagem 2">
+          <p:cNvPr id="5" name="Imagem 4">
             <a:extLst>
               <a:ext uri="{FF2B5EF4-FFF2-40B4-BE49-F238E27FC236}">
-                <a16:creationId xmlns:a16="http://schemas.microsoft.com/office/drawing/2014/main" id="{0F252917-ECF4-442A-96AB-395EB7B14D10}"/>
+                <a16:creationId xmlns:a16="http://schemas.microsoft.com/office/drawing/2014/main" id="{6B5FD55F-B714-42CA-8BF8-C7B0AF138695}"/>
               </a:ext>
             </a:extLst>
           </p:cNvPr>
@@ -15269,13 +15384,14 @@
         </p:nvPicPr>
         <p:blipFill>
           <a:blip r:embed="rId3"/>
-          <a:srcRect/>
-          <a:stretch/>
+          <a:stretch>
+            <a:fillRect/>
+          </a:stretch>
         </p:blipFill>
         <p:spPr>
           <a:xfrm>
-            <a:off x="1095042" y="431150"/>
-            <a:ext cx="6953915" cy="4174408"/>
+            <a:off x="1660711" y="205907"/>
+            <a:ext cx="5943600" cy="4314825"/>
           </a:xfrm>
           <a:prstGeom prst="rect">
             <a:avLst/>
@@ -15285,7 +15401,7 @@
     </p:spTree>
     <p:extLst>
       <p:ext uri="{BB962C8B-B14F-4D97-AF65-F5344CB8AC3E}">
-        <p14:creationId xmlns:p14="http://schemas.microsoft.com/office/powerpoint/2010/main" val="3089370334"/>
+        <p14:creationId xmlns:p14="http://schemas.microsoft.com/office/powerpoint/2010/main" val="43124614"/>
       </p:ext>
     </p:extLst>
   </p:cSld>

</xml_diff>